<commit_message>
final edits before 3.19.19 webinar
</commit_message>
<xml_diff>
--- a/resources/member_data_webinar.pptx
+++ b/resources/member_data_webinar.pptx
@@ -5,7 +5,7 @@
     <p:sldMasterId id="2147483648" r:id="rId1"/>
   </p:sldMasterIdLst>
   <p:notesMasterIdLst>
-    <p:notesMasterId r:id="rId16"/>
+    <p:notesMasterId r:id="rId20"/>
   </p:notesMasterIdLst>
   <p:sldIdLst>
     <p:sldId id="256" r:id="rId2"/>
@@ -14,14 +14,18 @@
     <p:sldId id="259" r:id="rId5"/>
     <p:sldId id="261" r:id="rId6"/>
     <p:sldId id="263" r:id="rId7"/>
-    <p:sldId id="264" r:id="rId8"/>
-    <p:sldId id="265" r:id="rId9"/>
-    <p:sldId id="266" r:id="rId10"/>
-    <p:sldId id="267" r:id="rId11"/>
-    <p:sldId id="268" r:id="rId12"/>
-    <p:sldId id="260" r:id="rId13"/>
-    <p:sldId id="269" r:id="rId14"/>
-    <p:sldId id="262" r:id="rId15"/>
+    <p:sldId id="273" r:id="rId8"/>
+    <p:sldId id="272" r:id="rId9"/>
+    <p:sldId id="264" r:id="rId10"/>
+    <p:sldId id="265" r:id="rId11"/>
+    <p:sldId id="266" r:id="rId12"/>
+    <p:sldId id="267" r:id="rId13"/>
+    <p:sldId id="268" r:id="rId14"/>
+    <p:sldId id="260" r:id="rId15"/>
+    <p:sldId id="271" r:id="rId16"/>
+    <p:sldId id="269" r:id="rId17"/>
+    <p:sldId id="270" r:id="rId18"/>
+    <p:sldId id="262" r:id="rId19"/>
   </p:sldIdLst>
   <p:sldSz cx="12192000" cy="6858000"/>
   <p:notesSz cx="6858000" cy="9144000"/>
@@ -120,6 +124,11 @@
       </a:defRPr>
     </a:lvl9pPr>
   </p:defaultTextStyle>
+  <p:extLst>
+    <p:ext uri="{EFAFB233-063F-42B5-8137-9DF3F51BA10A}">
+      <p15:sldGuideLst xmlns:p15="http://schemas.microsoft.com/office/powerpoint/2012/main"/>
+    </p:ext>
+  </p:extLst>
 </p:presentation>
 </file>
 
@@ -518,15 +527,7 @@
           <a:p>
             <a:r>
               <a:rPr lang="en-US" dirty="0"/>
-              <a:t>Show where the access point is though the </a:t>
-            </a:r>
-            <a:r>
-              <a:rPr lang="en-US" dirty="0" err="1"/>
-              <a:t>Wl</a:t>
-            </a:r>
-            <a:r>
-              <a:rPr lang="en-US" dirty="0"/>
-              <a:t> website here</a:t>
+              <a:t>NAAL = “National Assessment of Adult Literacy”</a:t>
             </a:r>
           </a:p>
         </p:txBody>
@@ -548,7 +549,7 @@
           <a:p>
             <a:fld id="{69A3F632-B16A-C740-9E1F-802944CA0F31}" type="slidenum">
               <a:rPr lang="en-US" smtClean="0"/>
-              <a:t>6</a:t>
+              <a:t>4</a:t>
             </a:fld>
             <a:endParaRPr lang="en-US"/>
           </a:p>
@@ -557,7 +558,7 @@
     </p:spTree>
     <p:extLst>
       <p:ext uri="{BB962C8B-B14F-4D97-AF65-F5344CB8AC3E}">
-        <p14:creationId xmlns:p14="http://schemas.microsoft.com/office/powerpoint/2010/main" val="1598589788"/>
+        <p14:creationId xmlns:p14="http://schemas.microsoft.com/office/powerpoint/2010/main" val="1127766673"/>
       </p:ext>
     </p:extLst>
   </p:cSld>
@@ -611,19 +612,7 @@
           <a:bodyPr/>
           <a:lstStyle/>
           <a:p>
-            <a:r>
-              <a:rPr lang="en-US" dirty="0"/>
-              <a:t>Include URL link in the PPT</a:t>
-            </a:r>
-          </a:p>
-          <a:p>
             <a:endParaRPr lang="en-US" dirty="0"/>
-          </a:p>
-          <a:p>
-            <a:r>
-              <a:rPr lang="en-US" dirty="0"/>
-              <a:t>Make it clear that we are presenting the data in plain language, reference other resources. Ask a comprehension question about the data presented, just to check to see if people are following</a:t>
-            </a:r>
           </a:p>
         </p:txBody>
       </p:sp>
@@ -644,7 +633,175 @@
           <a:p>
             <a:fld id="{69A3F632-B16A-C740-9E1F-802944CA0F31}" type="slidenum">
               <a:rPr lang="en-US" smtClean="0"/>
-              <a:t>11</a:t>
+              <a:t>6</a:t>
+            </a:fld>
+            <a:endParaRPr lang="en-US"/>
+          </a:p>
+        </p:txBody>
+      </p:sp>
+    </p:spTree>
+    <p:extLst>
+      <p:ext uri="{BB962C8B-B14F-4D97-AF65-F5344CB8AC3E}">
+        <p14:creationId xmlns:p14="http://schemas.microsoft.com/office/powerpoint/2010/main" val="1598589788"/>
+      </p:ext>
+    </p:extLst>
+  </p:cSld>
+  <p:clrMapOvr>
+    <a:masterClrMapping/>
+  </p:clrMapOvr>
+</p:notes>
+</file>
+
+<file path=ppt/notesSlides/notesSlide3.xml><?xml version="1.0" encoding="utf-8"?>
+<p:notes xmlns:a="http://schemas.openxmlformats.org/drawingml/2006/main" xmlns:r="http://schemas.openxmlformats.org/officeDocument/2006/relationships" xmlns:p="http://schemas.openxmlformats.org/presentationml/2006/main">
+  <p:cSld>
+    <p:spTree>
+      <p:nvGrpSpPr>
+        <p:cNvPr id="1" name=""/>
+        <p:cNvGrpSpPr/>
+        <p:nvPr/>
+      </p:nvGrpSpPr>
+      <p:grpSpPr>
+        <a:xfrm>
+          <a:off x="0" y="0"/>
+          <a:ext cx="0" cy="0"/>
+          <a:chOff x="0" y="0"/>
+          <a:chExt cx="0" cy="0"/>
+        </a:xfrm>
+      </p:grpSpPr>
+      <p:sp>
+        <p:nvSpPr>
+          <p:cNvPr id="2" name="Slide Image Placeholder 1"/>
+          <p:cNvSpPr>
+            <a:spLocks noGrp="1" noRot="1" noChangeAspect="1"/>
+          </p:cNvSpPr>
+          <p:nvPr>
+            <p:ph type="sldImg"/>
+          </p:nvPr>
+        </p:nvSpPr>
+        <p:spPr/>
+      </p:sp>
+      <p:sp>
+        <p:nvSpPr>
+          <p:cNvPr id="3" name="Notes Placeholder 2"/>
+          <p:cNvSpPr>
+            <a:spLocks noGrp="1"/>
+          </p:cNvSpPr>
+          <p:nvPr>
+            <p:ph type="body" idx="1"/>
+          </p:nvPr>
+        </p:nvSpPr>
+        <p:spPr/>
+        <p:txBody>
+          <a:bodyPr/>
+          <a:lstStyle/>
+          <a:p>
+            <a:endParaRPr lang="en-US" dirty="0"/>
+          </a:p>
+        </p:txBody>
+      </p:sp>
+      <p:sp>
+        <p:nvSpPr>
+          <p:cNvPr id="4" name="Slide Number Placeholder 3"/>
+          <p:cNvSpPr>
+            <a:spLocks noGrp="1"/>
+          </p:cNvSpPr>
+          <p:nvPr>
+            <p:ph type="sldNum" sz="quarter" idx="5"/>
+          </p:nvPr>
+        </p:nvSpPr>
+        <p:spPr/>
+        <p:txBody>
+          <a:bodyPr/>
+          <a:lstStyle/>
+          <a:p>
+            <a:fld id="{69A3F632-B16A-C740-9E1F-802944CA0F31}" type="slidenum">
+              <a:rPr lang="en-US" smtClean="0"/>
+              <a:t>12</a:t>
+            </a:fld>
+            <a:endParaRPr lang="en-US"/>
+          </a:p>
+        </p:txBody>
+      </p:sp>
+    </p:spTree>
+    <p:extLst>
+      <p:ext uri="{BB962C8B-B14F-4D97-AF65-F5344CB8AC3E}">
+        <p14:creationId xmlns:p14="http://schemas.microsoft.com/office/powerpoint/2010/main" val="3432206405"/>
+      </p:ext>
+    </p:extLst>
+  </p:cSld>
+  <p:clrMapOvr>
+    <a:masterClrMapping/>
+  </p:clrMapOvr>
+</p:notes>
+</file>
+
+<file path=ppt/notesSlides/notesSlide4.xml><?xml version="1.0" encoding="utf-8"?>
+<p:notes xmlns:a="http://schemas.openxmlformats.org/drawingml/2006/main" xmlns:r="http://schemas.openxmlformats.org/officeDocument/2006/relationships" xmlns:p="http://schemas.openxmlformats.org/presentationml/2006/main">
+  <p:cSld>
+    <p:spTree>
+      <p:nvGrpSpPr>
+        <p:cNvPr id="1" name=""/>
+        <p:cNvGrpSpPr/>
+        <p:nvPr/>
+      </p:nvGrpSpPr>
+      <p:grpSpPr>
+        <a:xfrm>
+          <a:off x="0" y="0"/>
+          <a:ext cx="0" cy="0"/>
+          <a:chOff x="0" y="0"/>
+          <a:chExt cx="0" cy="0"/>
+        </a:xfrm>
+      </p:grpSpPr>
+      <p:sp>
+        <p:nvSpPr>
+          <p:cNvPr id="2" name="Slide Image Placeholder 1"/>
+          <p:cNvSpPr>
+            <a:spLocks noGrp="1" noRot="1" noChangeAspect="1"/>
+          </p:cNvSpPr>
+          <p:nvPr>
+            <p:ph type="sldImg"/>
+          </p:nvPr>
+        </p:nvSpPr>
+        <p:spPr/>
+      </p:sp>
+      <p:sp>
+        <p:nvSpPr>
+          <p:cNvPr id="3" name="Notes Placeholder 2"/>
+          <p:cNvSpPr>
+            <a:spLocks noGrp="1"/>
+          </p:cNvSpPr>
+          <p:nvPr>
+            <p:ph type="body" idx="1"/>
+          </p:nvPr>
+        </p:nvSpPr>
+        <p:spPr/>
+        <p:txBody>
+          <a:bodyPr/>
+          <a:lstStyle/>
+          <a:p>
+            <a:endParaRPr lang="en-US" dirty="0"/>
+          </a:p>
+        </p:txBody>
+      </p:sp>
+      <p:sp>
+        <p:nvSpPr>
+          <p:cNvPr id="4" name="Slide Number Placeholder 3"/>
+          <p:cNvSpPr>
+            <a:spLocks noGrp="1"/>
+          </p:cNvSpPr>
+          <p:nvPr>
+            <p:ph type="sldNum" sz="quarter" idx="5"/>
+          </p:nvPr>
+        </p:nvSpPr>
+        <p:spPr/>
+        <p:txBody>
+          <a:bodyPr/>
+          <a:lstStyle/>
+          <a:p>
+            <a:fld id="{69A3F632-B16A-C740-9E1F-802944CA0F31}" type="slidenum">
+              <a:rPr lang="en-US" smtClean="0"/>
+              <a:t>13</a:t>
             </a:fld>
             <a:endParaRPr lang="en-US"/>
           </a:p>
@@ -3895,8 +4052,8 @@
         </p:nvSpPr>
         <p:spPr>
           <a:xfrm>
-            <a:off x="1371600" y="1331913"/>
-            <a:ext cx="9563100" cy="2387600"/>
+            <a:off x="1371600" y="1903413"/>
+            <a:ext cx="9144000" cy="2387600"/>
           </a:xfrm>
         </p:spPr>
         <p:txBody>
@@ -3906,7 +4063,7 @@
           <a:lstStyle/>
           <a:p>
             <a:r>
-              <a:rPr lang="en-US" sz="6700" dirty="0"/>
+              <a:rPr lang="en-US" sz="6700" b="1" dirty="0"/>
               <a:t>Wisconsin Literacy</a:t>
             </a:r>
             <a:br>
@@ -3944,7 +4101,7 @@
         </p:nvSpPr>
         <p:spPr>
           <a:xfrm>
-            <a:off x="1524000" y="3716338"/>
+            <a:off x="1524000" y="4287838"/>
             <a:ext cx="9144000" cy="855662"/>
           </a:xfrm>
         </p:spPr>
@@ -4055,8 +4212,8 @@
         </p:nvSpPr>
         <p:spPr>
           <a:xfrm>
-            <a:off x="5663275" y="1867831"/>
-            <a:ext cx="4974988" cy="3997709"/>
+            <a:off x="1738043" y="2096432"/>
+            <a:ext cx="3436124" cy="1287964"/>
           </a:xfrm>
           <a:prstGeom prst="ellipse">
             <a:avLst/>
@@ -4108,8 +4265,8 @@
         </p:nvSpPr>
         <p:spPr>
           <a:xfrm>
-            <a:off x="10449354" y="5657671"/>
-            <a:ext cx="1742646" cy="1200329"/>
+            <a:off x="200722" y="2096432"/>
+            <a:ext cx="1036822" cy="461665"/>
           </a:xfrm>
           <a:prstGeom prst="rect">
             <a:avLst/>
@@ -4117,7 +4274,7 @@
           <a:noFill/>
         </p:spPr>
         <p:txBody>
-          <a:bodyPr wrap="square" rtlCol="0">
+          <a:bodyPr wrap="none" rtlCol="0">
             <a:spAutoFit/>
           </a:bodyPr>
           <a:lstStyle/>
@@ -4128,17 +4285,7 @@
                   <a:srgbClr val="C00000"/>
                 </a:solidFill>
               </a:rPr>
-              <a:t>graph and</a:t>
-            </a:r>
-          </a:p>
-          <a:p>
-            <a:r>
-              <a:rPr lang="en-US" sz="2400" dirty="0">
-                <a:solidFill>
-                  <a:srgbClr val="C00000"/>
-                </a:solidFill>
-              </a:rPr>
-              <a:t>explanation will appear</a:t>
+              <a:t>county</a:t>
             </a:r>
           </a:p>
         </p:txBody>
@@ -4153,15 +4300,14 @@
             </a:extLst>
           </p:cNvPr>
           <p:cNvCxnSpPr>
-            <a:cxnSpLocks/>
-            <a:stCxn id="7" idx="0"/>
+            <a:stCxn id="7" idx="2"/>
           </p:cNvCxnSpPr>
           <p:nvPr/>
         </p:nvCxnSpPr>
         <p:spPr>
-          <a:xfrm flipH="1" flipV="1">
-            <a:off x="10449354" y="5107259"/>
-            <a:ext cx="871323" cy="550412"/>
+          <a:xfrm>
+            <a:off x="719133" y="2558097"/>
+            <a:ext cx="819735" cy="162801"/>
           </a:xfrm>
           <a:prstGeom prst="straightConnector1">
             <a:avLst/>
@@ -4191,7 +4337,7 @@
     </p:spTree>
     <p:extLst>
       <p:ext uri="{BB962C8B-B14F-4D97-AF65-F5344CB8AC3E}">
-        <p14:creationId xmlns:p14="http://schemas.microsoft.com/office/powerpoint/2010/main" val="2421728743"/>
+        <p14:creationId xmlns:p14="http://schemas.microsoft.com/office/powerpoint/2010/main" val="3842645150"/>
       </p:ext>
     </p:extLst>
   </p:cSld>
@@ -4351,49 +4497,315 @@
           <a:chExt cx="0" cy="0"/>
         </a:xfrm>
       </p:grpSpPr>
-      <p:sp>
-        <p:nvSpPr>
-          <p:cNvPr id="2" name="Title 1">
-            <a:extLst>
-              <a:ext uri="{FF2B5EF4-FFF2-40B4-BE49-F238E27FC236}">
-                <a16:creationId xmlns:a16="http://schemas.microsoft.com/office/drawing/2014/main" id="{C2E0160C-84D2-2D44-A432-863A58E38705}"/>
-              </a:ext>
-            </a:extLst>
-          </p:cNvPr>
-          <p:cNvSpPr>
-            <a:spLocks noGrp="1"/>
-          </p:cNvSpPr>
-          <p:nvPr>
-            <p:ph type="title"/>
-          </p:nvPr>
-        </p:nvSpPr>
+      <p:pic>
+        <p:nvPicPr>
+          <p:cNvPr id="5" name="Picture 4" descr="A screenshot of a social media post&#10;&#10;Description automatically generated">
+            <a:extLst>
+              <a:ext uri="{FF2B5EF4-FFF2-40B4-BE49-F238E27FC236}">
+                <a16:creationId xmlns:a16="http://schemas.microsoft.com/office/drawing/2014/main" id="{BB0D1C69-96E5-F049-9A48-901AFB2A562F}"/>
+              </a:ext>
+            </a:extLst>
+          </p:cNvPr>
+          <p:cNvPicPr>
+            <a:picLocks noChangeAspect="1"/>
+          </p:cNvPicPr>
+          <p:nvPr/>
+        </p:nvPicPr>
+        <p:blipFill>
+          <a:blip r:embed="rId2"/>
+          <a:stretch>
+            <a:fillRect/>
+          </a:stretch>
+        </p:blipFill>
         <p:spPr>
           <a:xfrm>
-            <a:off x="3080524" y="2498589"/>
-            <a:ext cx="6030951" cy="1325563"/>
+            <a:off x="1358900" y="534020"/>
+            <a:ext cx="9474200" cy="6146800"/>
           </a:xfrm>
+          <a:prstGeom prst="rect">
+            <a:avLst/>
+          </a:prstGeom>
         </p:spPr>
-        <p:txBody>
-          <a:bodyPr/>
+      </p:pic>
+      <p:sp>
+        <p:nvSpPr>
+          <p:cNvPr id="6" name="Oval 5">
+            <a:extLst>
+              <a:ext uri="{FF2B5EF4-FFF2-40B4-BE49-F238E27FC236}">
+                <a16:creationId xmlns:a16="http://schemas.microsoft.com/office/drawing/2014/main" id="{656005CF-6876-C140-8005-06698AE6BD67}"/>
+              </a:ext>
+            </a:extLst>
+          </p:cNvPr>
+          <p:cNvSpPr/>
+          <p:nvPr/>
+        </p:nvSpPr>
+        <p:spPr>
+          <a:xfrm>
+            <a:off x="1581929" y="3077741"/>
+            <a:ext cx="3703752" cy="1561168"/>
+          </a:xfrm>
+          <a:prstGeom prst="ellipse">
+            <a:avLst/>
+          </a:prstGeom>
+          <a:noFill/>
+          <a:ln w="41275">
+            <a:solidFill>
+              <a:srgbClr val="C00000"/>
+            </a:solidFill>
+            <a:prstDash val="sysDot"/>
+          </a:ln>
+        </p:spPr>
+        <p:style>
+          <a:lnRef idx="2">
+            <a:schemeClr val="accent1">
+              <a:shade val="50000"/>
+            </a:schemeClr>
+          </a:lnRef>
+          <a:fillRef idx="1">
+            <a:schemeClr val="accent1"/>
+          </a:fillRef>
+          <a:effectRef idx="0">
+            <a:schemeClr val="accent1"/>
+          </a:effectRef>
+          <a:fontRef idx="minor">
+            <a:schemeClr val="lt1"/>
+          </a:fontRef>
+        </p:style>
+        <p:txBody>
+          <a:bodyPr rtlCol="0" anchor="ctr"/>
           <a:lstStyle/>
           <a:p>
-            <a:r>
-              <a:rPr lang="en-US" dirty="0"/>
-              <a:t>Let’s go to the application</a:t>
-            </a:r>
-          </a:p>
-        </p:txBody>
-      </p:sp>
+            <a:pPr algn="ctr"/>
+            <a:endParaRPr lang="en-US" dirty="0"/>
+          </a:p>
+        </p:txBody>
+      </p:sp>
+      <p:sp>
+        <p:nvSpPr>
+          <p:cNvPr id="7" name="TextBox 6">
+            <a:extLst>
+              <a:ext uri="{FF2B5EF4-FFF2-40B4-BE49-F238E27FC236}">
+                <a16:creationId xmlns:a16="http://schemas.microsoft.com/office/drawing/2014/main" id="{65E7E879-7387-8641-96BE-7A196924F4D7}"/>
+              </a:ext>
+            </a:extLst>
+          </p:cNvPr>
+          <p:cNvSpPr txBox="1"/>
+          <p:nvPr/>
+        </p:nvSpPr>
+        <p:spPr>
+          <a:xfrm>
+            <a:off x="200722" y="3144647"/>
+            <a:ext cx="1178849" cy="461665"/>
+          </a:xfrm>
+          <a:prstGeom prst="rect">
+            <a:avLst/>
+          </a:prstGeom>
+          <a:noFill/>
+        </p:spPr>
+        <p:txBody>
+          <a:bodyPr wrap="none" rtlCol="0">
+            <a:spAutoFit/>
+          </a:bodyPr>
+          <a:lstStyle/>
+          <a:p>
+            <a:r>
+              <a:rPr lang="en-US" sz="2400" dirty="0">
+                <a:solidFill>
+                  <a:srgbClr val="C00000"/>
+                </a:solidFill>
+              </a:rPr>
+              <a:t>variable</a:t>
+            </a:r>
+          </a:p>
+        </p:txBody>
+      </p:sp>
+      <p:cxnSp>
+        <p:nvCxnSpPr>
+          <p:cNvPr id="9" name="Straight Arrow Connector 8">
+            <a:extLst>
+              <a:ext uri="{FF2B5EF4-FFF2-40B4-BE49-F238E27FC236}">
+                <a16:creationId xmlns:a16="http://schemas.microsoft.com/office/drawing/2014/main" id="{428C0CFF-48A7-E348-A427-C0F80393BA6E}"/>
+              </a:ext>
+            </a:extLst>
+          </p:cNvPr>
+          <p:cNvCxnSpPr>
+            <a:stCxn id="7" idx="2"/>
+          </p:cNvCxnSpPr>
+          <p:nvPr/>
+        </p:nvCxnSpPr>
+        <p:spPr>
+          <a:xfrm>
+            <a:off x="790147" y="3606312"/>
+            <a:ext cx="748721" cy="162801"/>
+          </a:xfrm>
+          <a:prstGeom prst="straightConnector1">
+            <a:avLst/>
+          </a:prstGeom>
+          <a:ln w="25400">
+            <a:solidFill>
+              <a:srgbClr val="C00000"/>
+            </a:solidFill>
+            <a:tailEnd type="triangle"/>
+          </a:ln>
+        </p:spPr>
+        <p:style>
+          <a:lnRef idx="1">
+            <a:schemeClr val="accent1"/>
+          </a:lnRef>
+          <a:fillRef idx="0">
+            <a:schemeClr val="accent1"/>
+          </a:fillRef>
+          <a:effectRef idx="0">
+            <a:schemeClr val="accent1"/>
+          </a:effectRef>
+          <a:fontRef idx="minor">
+            <a:schemeClr val="tx1"/>
+          </a:fontRef>
+        </p:style>
+      </p:cxnSp>
     </p:spTree>
     <p:extLst>
       <p:ext uri="{BB962C8B-B14F-4D97-AF65-F5344CB8AC3E}">
-        <p14:creationId xmlns:p14="http://schemas.microsoft.com/office/powerpoint/2010/main" val="2226867841"/>
+        <p14:creationId xmlns:p14="http://schemas.microsoft.com/office/powerpoint/2010/main" val="32404226"/>
       </p:ext>
     </p:extLst>
   </p:cSld>
   <p:clrMapOvr>
     <a:masterClrMapping/>
   </p:clrMapOvr>
+  <p:timing>
+    <p:tnLst>
+      <p:par>
+        <p:cTn id="1" dur="indefinite" restart="never" nodeType="tmRoot">
+          <p:childTnLst>
+            <p:seq concurrent="1" nextAc="seek">
+              <p:cTn id="2" dur="indefinite" nodeType="mainSeq">
+                <p:childTnLst>
+                  <p:par>
+                    <p:cTn id="3" fill="hold">
+                      <p:stCondLst>
+                        <p:cond delay="indefinite"/>
+                      </p:stCondLst>
+                      <p:childTnLst>
+                        <p:par>
+                          <p:cTn id="4" fill="hold">
+                            <p:stCondLst>
+                              <p:cond delay="0"/>
+                            </p:stCondLst>
+                            <p:childTnLst>
+                              <p:par>
+                                <p:cTn id="5" presetID="1" presetClass="entr" presetSubtype="0" fill="hold" grpId="0" nodeType="clickEffect">
+                                  <p:stCondLst>
+                                    <p:cond delay="0"/>
+                                  </p:stCondLst>
+                                  <p:childTnLst>
+                                    <p:set>
+                                      <p:cBhvr>
+                                        <p:cTn id="6" dur="1" fill="hold">
+                                          <p:stCondLst>
+                                            <p:cond delay="0"/>
+                                          </p:stCondLst>
+                                        </p:cTn>
+                                        <p:tgtEl>
+                                          <p:spTgt spid="6"/>
+                                        </p:tgtEl>
+                                        <p:attrNameLst>
+                                          <p:attrName>style.visibility</p:attrName>
+                                        </p:attrNameLst>
+                                      </p:cBhvr>
+                                      <p:to>
+                                        <p:strVal val="visible"/>
+                                      </p:to>
+                                    </p:set>
+                                  </p:childTnLst>
+                                </p:cTn>
+                              </p:par>
+                              <p:par>
+                                <p:cTn id="7" presetID="1" presetClass="entr" presetSubtype="0" fill="hold" nodeType="withEffect">
+                                  <p:stCondLst>
+                                    <p:cond delay="0"/>
+                                  </p:stCondLst>
+                                  <p:childTnLst>
+                                    <p:set>
+                                      <p:cBhvr>
+                                        <p:cTn id="8" dur="1" fill="hold">
+                                          <p:stCondLst>
+                                            <p:cond delay="0"/>
+                                          </p:stCondLst>
+                                        </p:cTn>
+                                        <p:tgtEl>
+                                          <p:spTgt spid="9"/>
+                                        </p:tgtEl>
+                                        <p:attrNameLst>
+                                          <p:attrName>style.visibility</p:attrName>
+                                        </p:attrNameLst>
+                                      </p:cBhvr>
+                                      <p:to>
+                                        <p:strVal val="visible"/>
+                                      </p:to>
+                                    </p:set>
+                                  </p:childTnLst>
+                                </p:cTn>
+                              </p:par>
+                              <p:par>
+                                <p:cTn id="9" presetID="1" presetClass="entr" presetSubtype="0" fill="hold" grpId="0" nodeType="withEffect">
+                                  <p:stCondLst>
+                                    <p:cond delay="0"/>
+                                  </p:stCondLst>
+                                  <p:childTnLst>
+                                    <p:set>
+                                      <p:cBhvr>
+                                        <p:cTn id="10" dur="1" fill="hold">
+                                          <p:stCondLst>
+                                            <p:cond delay="0"/>
+                                          </p:stCondLst>
+                                        </p:cTn>
+                                        <p:tgtEl>
+                                          <p:spTgt spid="7"/>
+                                        </p:tgtEl>
+                                        <p:attrNameLst>
+                                          <p:attrName>style.visibility</p:attrName>
+                                        </p:attrNameLst>
+                                      </p:cBhvr>
+                                      <p:to>
+                                        <p:strVal val="visible"/>
+                                      </p:to>
+                                    </p:set>
+                                  </p:childTnLst>
+                                </p:cTn>
+                              </p:par>
+                            </p:childTnLst>
+                          </p:cTn>
+                        </p:par>
+                      </p:childTnLst>
+                    </p:cTn>
+                  </p:par>
+                </p:childTnLst>
+              </p:cTn>
+              <p:prevCondLst>
+                <p:cond evt="onPrev" delay="0">
+                  <p:tgtEl>
+                    <p:sldTgt/>
+                  </p:tgtEl>
+                </p:cond>
+              </p:prevCondLst>
+              <p:nextCondLst>
+                <p:cond evt="onNext" delay="0">
+                  <p:tgtEl>
+                    <p:sldTgt/>
+                  </p:tgtEl>
+                </p:cond>
+              </p:nextCondLst>
+            </p:seq>
+          </p:childTnLst>
+        </p:cTn>
+      </p:par>
+    </p:tnLst>
+    <p:bldLst>
+      <p:bldP spid="6" grpId="0" animBg="1"/>
+      <p:bldP spid="7" grpId="0"/>
+    </p:bldLst>
+  </p:timing>
 </p:sld>
 </file>
 
@@ -4414,12 +4826,424 @@
           <a:chExt cx="0" cy="0"/>
         </a:xfrm>
       </p:grpSpPr>
+      <p:pic>
+        <p:nvPicPr>
+          <p:cNvPr id="5" name="Picture 4" descr="A screenshot of a social media post&#10;&#10;Description automatically generated">
+            <a:extLst>
+              <a:ext uri="{FF2B5EF4-FFF2-40B4-BE49-F238E27FC236}">
+                <a16:creationId xmlns:a16="http://schemas.microsoft.com/office/drawing/2014/main" id="{BB0D1C69-96E5-F049-9A48-901AFB2A562F}"/>
+              </a:ext>
+            </a:extLst>
+          </p:cNvPr>
+          <p:cNvPicPr>
+            <a:picLocks noChangeAspect="1"/>
+          </p:cNvPicPr>
+          <p:nvPr/>
+        </p:nvPicPr>
+        <p:blipFill>
+          <a:blip r:embed="rId3"/>
+          <a:stretch>
+            <a:fillRect/>
+          </a:stretch>
+        </p:blipFill>
+        <p:spPr>
+          <a:xfrm>
+            <a:off x="1358900" y="534020"/>
+            <a:ext cx="9474200" cy="6146800"/>
+          </a:xfrm>
+          <a:prstGeom prst="rect">
+            <a:avLst/>
+          </a:prstGeom>
+        </p:spPr>
+      </p:pic>
+      <p:sp>
+        <p:nvSpPr>
+          <p:cNvPr id="6" name="Oval 5">
+            <a:extLst>
+              <a:ext uri="{FF2B5EF4-FFF2-40B4-BE49-F238E27FC236}">
+                <a16:creationId xmlns:a16="http://schemas.microsoft.com/office/drawing/2014/main" id="{656005CF-6876-C140-8005-06698AE6BD67}"/>
+              </a:ext>
+            </a:extLst>
+          </p:cNvPr>
+          <p:cNvSpPr/>
+          <p:nvPr/>
+        </p:nvSpPr>
+        <p:spPr>
+          <a:xfrm>
+            <a:off x="5663275" y="1867831"/>
+            <a:ext cx="4974988" cy="3997709"/>
+          </a:xfrm>
+          <a:prstGeom prst="ellipse">
+            <a:avLst/>
+          </a:prstGeom>
+          <a:noFill/>
+          <a:ln w="41275">
+            <a:solidFill>
+              <a:srgbClr val="C00000"/>
+            </a:solidFill>
+            <a:prstDash val="sysDot"/>
+          </a:ln>
+        </p:spPr>
+        <p:style>
+          <a:lnRef idx="2">
+            <a:schemeClr val="accent1">
+              <a:shade val="50000"/>
+            </a:schemeClr>
+          </a:lnRef>
+          <a:fillRef idx="1">
+            <a:schemeClr val="accent1"/>
+          </a:fillRef>
+          <a:effectRef idx="0">
+            <a:schemeClr val="accent1"/>
+          </a:effectRef>
+          <a:fontRef idx="minor">
+            <a:schemeClr val="lt1"/>
+          </a:fontRef>
+        </p:style>
+        <p:txBody>
+          <a:bodyPr rtlCol="0" anchor="ctr"/>
+          <a:lstStyle/>
+          <a:p>
+            <a:pPr algn="ctr"/>
+            <a:endParaRPr lang="en-US" dirty="0"/>
+          </a:p>
+        </p:txBody>
+      </p:sp>
+      <p:sp>
+        <p:nvSpPr>
+          <p:cNvPr id="7" name="TextBox 6">
+            <a:extLst>
+              <a:ext uri="{FF2B5EF4-FFF2-40B4-BE49-F238E27FC236}">
+                <a16:creationId xmlns:a16="http://schemas.microsoft.com/office/drawing/2014/main" id="{65E7E879-7387-8641-96BE-7A196924F4D7}"/>
+              </a:ext>
+            </a:extLst>
+          </p:cNvPr>
+          <p:cNvSpPr txBox="1"/>
+          <p:nvPr/>
+        </p:nvSpPr>
+        <p:spPr>
+          <a:xfrm>
+            <a:off x="10449354" y="5657671"/>
+            <a:ext cx="1742646" cy="1200329"/>
+          </a:xfrm>
+          <a:prstGeom prst="rect">
+            <a:avLst/>
+          </a:prstGeom>
+          <a:noFill/>
+        </p:spPr>
+        <p:txBody>
+          <a:bodyPr wrap="square" rtlCol="0">
+            <a:spAutoFit/>
+          </a:bodyPr>
+          <a:lstStyle/>
+          <a:p>
+            <a:r>
+              <a:rPr lang="en-US" sz="2400" dirty="0">
+                <a:solidFill>
+                  <a:srgbClr val="C00000"/>
+                </a:solidFill>
+              </a:rPr>
+              <a:t>graph and</a:t>
+            </a:r>
+          </a:p>
+          <a:p>
+            <a:r>
+              <a:rPr lang="en-US" sz="2400" dirty="0">
+                <a:solidFill>
+                  <a:srgbClr val="C00000"/>
+                </a:solidFill>
+              </a:rPr>
+              <a:t>explanation will appear</a:t>
+            </a:r>
+          </a:p>
+        </p:txBody>
+      </p:sp>
+      <p:cxnSp>
+        <p:nvCxnSpPr>
+          <p:cNvPr id="9" name="Straight Arrow Connector 8">
+            <a:extLst>
+              <a:ext uri="{FF2B5EF4-FFF2-40B4-BE49-F238E27FC236}">
+                <a16:creationId xmlns:a16="http://schemas.microsoft.com/office/drawing/2014/main" id="{428C0CFF-48A7-E348-A427-C0F80393BA6E}"/>
+              </a:ext>
+            </a:extLst>
+          </p:cNvPr>
+          <p:cNvCxnSpPr>
+            <a:cxnSpLocks/>
+            <a:stCxn id="7" idx="0"/>
+          </p:cNvCxnSpPr>
+          <p:nvPr/>
+        </p:nvCxnSpPr>
+        <p:spPr>
+          <a:xfrm flipH="1" flipV="1">
+            <a:off x="10449354" y="5107259"/>
+            <a:ext cx="871323" cy="550412"/>
+          </a:xfrm>
+          <a:prstGeom prst="straightConnector1">
+            <a:avLst/>
+          </a:prstGeom>
+          <a:ln w="25400">
+            <a:solidFill>
+              <a:srgbClr val="C00000"/>
+            </a:solidFill>
+            <a:tailEnd type="triangle"/>
+          </a:ln>
+        </p:spPr>
+        <p:style>
+          <a:lnRef idx="1">
+            <a:schemeClr val="accent1"/>
+          </a:lnRef>
+          <a:fillRef idx="0">
+            <a:schemeClr val="accent1"/>
+          </a:fillRef>
+          <a:effectRef idx="0">
+            <a:schemeClr val="accent1"/>
+          </a:effectRef>
+          <a:fontRef idx="minor">
+            <a:schemeClr val="tx1"/>
+          </a:fontRef>
+        </p:style>
+      </p:cxnSp>
+      <p:cxnSp>
+        <p:nvCxnSpPr>
+          <p:cNvPr id="8" name="Straight Arrow Connector 7">
+            <a:extLst>
+              <a:ext uri="{FF2B5EF4-FFF2-40B4-BE49-F238E27FC236}">
+                <a16:creationId xmlns:a16="http://schemas.microsoft.com/office/drawing/2014/main" id="{E99892FD-A85E-0544-93B7-5927FCEC994F}"/>
+              </a:ext>
+            </a:extLst>
+          </p:cNvPr>
+          <p:cNvCxnSpPr>
+            <a:cxnSpLocks/>
+            <a:stCxn id="7" idx="0"/>
+          </p:cNvCxnSpPr>
+          <p:nvPr/>
+        </p:nvCxnSpPr>
+        <p:spPr>
+          <a:xfrm flipH="1" flipV="1">
+            <a:off x="11018185" y="4824248"/>
+            <a:ext cx="302492" cy="833423"/>
+          </a:xfrm>
+          <a:prstGeom prst="straightConnector1">
+            <a:avLst/>
+          </a:prstGeom>
+          <a:ln w="25400">
+            <a:solidFill>
+              <a:srgbClr val="C00000"/>
+            </a:solidFill>
+            <a:tailEnd type="triangle"/>
+          </a:ln>
+        </p:spPr>
+        <p:style>
+          <a:lnRef idx="1">
+            <a:schemeClr val="accent1"/>
+          </a:lnRef>
+          <a:fillRef idx="0">
+            <a:schemeClr val="accent1"/>
+          </a:fillRef>
+          <a:effectRef idx="0">
+            <a:schemeClr val="accent1"/>
+          </a:effectRef>
+          <a:fontRef idx="minor">
+            <a:schemeClr val="tx1"/>
+          </a:fontRef>
+        </p:style>
+      </p:cxnSp>
+    </p:spTree>
+    <p:extLst>
+      <p:ext uri="{BB962C8B-B14F-4D97-AF65-F5344CB8AC3E}">
+        <p14:creationId xmlns:p14="http://schemas.microsoft.com/office/powerpoint/2010/main" val="2421728743"/>
+      </p:ext>
+    </p:extLst>
+  </p:cSld>
+  <p:clrMapOvr>
+    <a:masterClrMapping/>
+  </p:clrMapOvr>
+  <p:timing>
+    <p:tnLst>
+      <p:par>
+        <p:cTn id="1" dur="indefinite" restart="never" nodeType="tmRoot">
+          <p:childTnLst>
+            <p:seq concurrent="1" nextAc="seek">
+              <p:cTn id="2" dur="indefinite" nodeType="mainSeq">
+                <p:childTnLst>
+                  <p:par>
+                    <p:cTn id="3" fill="hold">
+                      <p:stCondLst>
+                        <p:cond delay="indefinite"/>
+                      </p:stCondLst>
+                      <p:childTnLst>
+                        <p:par>
+                          <p:cTn id="4" fill="hold">
+                            <p:stCondLst>
+                              <p:cond delay="0"/>
+                            </p:stCondLst>
+                            <p:childTnLst>
+                              <p:par>
+                                <p:cTn id="5" presetID="1" presetClass="entr" presetSubtype="0" fill="hold" grpId="0" nodeType="clickEffect">
+                                  <p:stCondLst>
+                                    <p:cond delay="0"/>
+                                  </p:stCondLst>
+                                  <p:childTnLst>
+                                    <p:set>
+                                      <p:cBhvr>
+                                        <p:cTn id="6" dur="1" fill="hold">
+                                          <p:stCondLst>
+                                            <p:cond delay="0"/>
+                                          </p:stCondLst>
+                                        </p:cTn>
+                                        <p:tgtEl>
+                                          <p:spTgt spid="6"/>
+                                        </p:tgtEl>
+                                        <p:attrNameLst>
+                                          <p:attrName>style.visibility</p:attrName>
+                                        </p:attrNameLst>
+                                      </p:cBhvr>
+                                      <p:to>
+                                        <p:strVal val="visible"/>
+                                      </p:to>
+                                    </p:set>
+                                  </p:childTnLst>
+                                </p:cTn>
+                              </p:par>
+                              <p:par>
+                                <p:cTn id="7" presetID="1" presetClass="entr" presetSubtype="0" fill="hold" nodeType="withEffect">
+                                  <p:stCondLst>
+                                    <p:cond delay="0"/>
+                                  </p:stCondLst>
+                                  <p:childTnLst>
+                                    <p:set>
+                                      <p:cBhvr>
+                                        <p:cTn id="8" dur="1" fill="hold">
+                                          <p:stCondLst>
+                                            <p:cond delay="0"/>
+                                          </p:stCondLst>
+                                        </p:cTn>
+                                        <p:tgtEl>
+                                          <p:spTgt spid="9"/>
+                                        </p:tgtEl>
+                                        <p:attrNameLst>
+                                          <p:attrName>style.visibility</p:attrName>
+                                        </p:attrNameLst>
+                                      </p:cBhvr>
+                                      <p:to>
+                                        <p:strVal val="visible"/>
+                                      </p:to>
+                                    </p:set>
+                                  </p:childTnLst>
+                                </p:cTn>
+                              </p:par>
+                              <p:par>
+                                <p:cTn id="9" presetID="1" presetClass="entr" presetSubtype="0" fill="hold" grpId="0" nodeType="withEffect">
+                                  <p:stCondLst>
+                                    <p:cond delay="0"/>
+                                  </p:stCondLst>
+                                  <p:childTnLst>
+                                    <p:set>
+                                      <p:cBhvr>
+                                        <p:cTn id="10" dur="1" fill="hold">
+                                          <p:stCondLst>
+                                            <p:cond delay="0"/>
+                                          </p:stCondLst>
+                                        </p:cTn>
+                                        <p:tgtEl>
+                                          <p:spTgt spid="7"/>
+                                        </p:tgtEl>
+                                        <p:attrNameLst>
+                                          <p:attrName>style.visibility</p:attrName>
+                                        </p:attrNameLst>
+                                      </p:cBhvr>
+                                      <p:to>
+                                        <p:strVal val="visible"/>
+                                      </p:to>
+                                    </p:set>
+                                  </p:childTnLst>
+                                </p:cTn>
+                              </p:par>
+                              <p:par>
+                                <p:cTn id="11" presetID="1" presetClass="entr" presetSubtype="0" fill="hold" nodeType="withEffect">
+                                  <p:stCondLst>
+                                    <p:cond delay="0"/>
+                                  </p:stCondLst>
+                                  <p:childTnLst>
+                                    <p:set>
+                                      <p:cBhvr>
+                                        <p:cTn id="12" dur="1" fill="hold">
+                                          <p:stCondLst>
+                                            <p:cond delay="0"/>
+                                          </p:stCondLst>
+                                        </p:cTn>
+                                        <p:tgtEl>
+                                          <p:spTgt spid="8"/>
+                                        </p:tgtEl>
+                                        <p:attrNameLst>
+                                          <p:attrName>style.visibility</p:attrName>
+                                        </p:attrNameLst>
+                                      </p:cBhvr>
+                                      <p:to>
+                                        <p:strVal val="visible"/>
+                                      </p:to>
+                                    </p:set>
+                                  </p:childTnLst>
+                                </p:cTn>
+                              </p:par>
+                            </p:childTnLst>
+                          </p:cTn>
+                        </p:par>
+                      </p:childTnLst>
+                    </p:cTn>
+                  </p:par>
+                </p:childTnLst>
+              </p:cTn>
+              <p:prevCondLst>
+                <p:cond evt="onPrev" delay="0">
+                  <p:tgtEl>
+                    <p:sldTgt/>
+                  </p:tgtEl>
+                </p:cond>
+              </p:prevCondLst>
+              <p:nextCondLst>
+                <p:cond evt="onNext" delay="0">
+                  <p:tgtEl>
+                    <p:sldTgt/>
+                  </p:tgtEl>
+                </p:cond>
+              </p:nextCondLst>
+            </p:seq>
+          </p:childTnLst>
+        </p:cTn>
+      </p:par>
+    </p:tnLst>
+    <p:bldLst>
+      <p:bldP spid="6" grpId="0" animBg="1"/>
+      <p:bldP spid="7" grpId="0"/>
+    </p:bldLst>
+  </p:timing>
+</p:sld>
+</file>
+
+<file path=ppt/slides/slide13.xml><?xml version="1.0" encoding="utf-8"?>
+<p:sld xmlns:a="http://schemas.openxmlformats.org/drawingml/2006/main" xmlns:r="http://schemas.openxmlformats.org/officeDocument/2006/relationships" xmlns:p="http://schemas.openxmlformats.org/presentationml/2006/main">
+  <p:cSld>
+    <p:spTree>
+      <p:nvGrpSpPr>
+        <p:cNvPr id="1" name=""/>
+        <p:cNvGrpSpPr/>
+        <p:nvPr/>
+      </p:nvGrpSpPr>
+      <p:grpSpPr>
+        <a:xfrm>
+          <a:off x="0" y="0"/>
+          <a:ext cx="0" cy="0"/>
+          <a:chOff x="0" y="0"/>
+          <a:chExt cx="0" cy="0"/>
+        </a:xfrm>
+      </p:grpSpPr>
       <p:sp>
         <p:nvSpPr>
           <p:cNvPr id="2" name="Title 1">
             <a:extLst>
               <a:ext uri="{FF2B5EF4-FFF2-40B4-BE49-F238E27FC236}">
-                <a16:creationId xmlns:a16="http://schemas.microsoft.com/office/drawing/2014/main" id="{B5FE6053-9733-6A4E-9DBA-2210F7398A70}"/>
+                <a16:creationId xmlns:a16="http://schemas.microsoft.com/office/drawing/2014/main" id="{C2E0160C-84D2-2D44-A432-863A58E38705}"/>
               </a:ext>
             </a:extLst>
           </p:cNvPr>
@@ -4430,6 +5254,130 @@
             <p:ph type="title"/>
           </p:nvPr>
         </p:nvSpPr>
+        <p:spPr>
+          <a:xfrm>
+            <a:off x="3080524" y="2498589"/>
+            <a:ext cx="6030951" cy="1325563"/>
+          </a:xfrm>
+        </p:spPr>
+        <p:txBody>
+          <a:bodyPr/>
+          <a:lstStyle/>
+          <a:p>
+            <a:r>
+              <a:rPr lang="en-US" dirty="0"/>
+              <a:t>Let’s go to the application</a:t>
+            </a:r>
+          </a:p>
+        </p:txBody>
+      </p:sp>
+      <p:sp>
+        <p:nvSpPr>
+          <p:cNvPr id="3" name="Title 1">
+            <a:extLst>
+              <a:ext uri="{FF2B5EF4-FFF2-40B4-BE49-F238E27FC236}">
+                <a16:creationId xmlns:a16="http://schemas.microsoft.com/office/drawing/2014/main" id="{DA310FA5-D828-1144-85D1-8C8F547946D1}"/>
+              </a:ext>
+            </a:extLst>
+          </p:cNvPr>
+          <p:cNvSpPr txBox="1">
+            <a:spLocks/>
+          </p:cNvSpPr>
+          <p:nvPr/>
+        </p:nvSpPr>
+        <p:spPr>
+          <a:xfrm>
+            <a:off x="9111475" y="6306160"/>
+            <a:ext cx="2763429" cy="551840"/>
+          </a:xfrm>
+          <a:prstGeom prst="rect">
+            <a:avLst/>
+          </a:prstGeom>
+        </p:spPr>
+        <p:txBody>
+          <a:bodyPr vert="horz" lIns="91440" tIns="45720" rIns="91440" bIns="45720" rtlCol="0" anchor="ctr">
+            <a:normAutofit fontScale="92500"/>
+          </a:bodyPr>
+          <a:lstStyle>
+            <a:lvl1pPr algn="l" defTabSz="914400" rtl="0" eaLnBrk="1" latinLnBrk="0" hangingPunct="1">
+              <a:lnSpc>
+                <a:spcPct val="90000"/>
+              </a:lnSpc>
+              <a:spcBef>
+                <a:spcPct val="0"/>
+              </a:spcBef>
+              <a:buNone/>
+              <a:defRPr sz="4400" kern="1200">
+                <a:solidFill>
+                  <a:schemeClr val="tx1"/>
+                </a:solidFill>
+                <a:latin typeface="+mj-lt"/>
+                <a:ea typeface="+mj-ea"/>
+                <a:cs typeface="+mj-cs"/>
+              </a:defRPr>
+            </a:lvl1pPr>
+          </a:lstStyle>
+          <a:p>
+            <a:r>
+              <a:rPr lang="en-US" sz="2200" dirty="0"/>
+              <a:t>You can also find it </a:t>
+            </a:r>
+            <a:r>
+              <a:rPr lang="en-US" sz="2200" dirty="0">
+                <a:hlinkClick r:id="rId3"/>
+              </a:rPr>
+              <a:t>here</a:t>
+            </a:r>
+            <a:endParaRPr lang="en-US" sz="2200" dirty="0"/>
+          </a:p>
+        </p:txBody>
+      </p:sp>
+    </p:spTree>
+    <p:extLst>
+      <p:ext uri="{BB962C8B-B14F-4D97-AF65-F5344CB8AC3E}">
+        <p14:creationId xmlns:p14="http://schemas.microsoft.com/office/powerpoint/2010/main" val="2226867841"/>
+      </p:ext>
+    </p:extLst>
+  </p:cSld>
+  <p:clrMapOvr>
+    <a:masterClrMapping/>
+  </p:clrMapOvr>
+</p:sld>
+</file>
+
+<file path=ppt/slides/slide14.xml><?xml version="1.0" encoding="utf-8"?>
+<p:sld xmlns:a="http://schemas.openxmlformats.org/drawingml/2006/main" xmlns:r="http://schemas.openxmlformats.org/officeDocument/2006/relationships" xmlns:p="http://schemas.openxmlformats.org/presentationml/2006/main">
+  <p:cSld>
+    <p:spTree>
+      <p:nvGrpSpPr>
+        <p:cNvPr id="1" name=""/>
+        <p:cNvGrpSpPr/>
+        <p:nvPr/>
+      </p:nvGrpSpPr>
+      <p:grpSpPr>
+        <a:xfrm>
+          <a:off x="0" y="0"/>
+          <a:ext cx="0" cy="0"/>
+          <a:chOff x="0" y="0"/>
+          <a:chExt cx="0" cy="0"/>
+        </a:xfrm>
+      </p:grpSpPr>
+      <p:sp>
+        <p:nvSpPr>
+          <p:cNvPr id="2" name="Title 1">
+            <a:extLst>
+              <a:ext uri="{FF2B5EF4-FFF2-40B4-BE49-F238E27FC236}">
+                <a16:creationId xmlns:a16="http://schemas.microsoft.com/office/drawing/2014/main" id="{B5FE6053-9733-6A4E-9DBA-2210F7398A70}"/>
+              </a:ext>
+            </a:extLst>
+          </p:cNvPr>
+          <p:cNvSpPr>
+            <a:spLocks noGrp="1"/>
+          </p:cNvSpPr>
+          <p:nvPr>
+            <p:ph type="title"/>
+          </p:nvPr>
+        </p:nvSpPr>
         <p:spPr/>
         <p:txBody>
           <a:bodyPr/>
@@ -4458,9 +5406,16 @@
             <p:ph idx="1"/>
           </p:nvPr>
         </p:nvSpPr>
-        <p:spPr/>
-        <p:txBody>
-          <a:bodyPr/>
+        <p:spPr>
+          <a:xfrm>
+            <a:off x="838200" y="1825625"/>
+            <a:ext cx="11353800" cy="4351338"/>
+          </a:xfrm>
+        </p:spPr>
+        <p:txBody>
+          <a:bodyPr>
+            <a:normAutofit/>
+          </a:bodyPr>
           <a:lstStyle/>
           <a:p>
             <a:r>
@@ -4483,15 +5438,8 @@
             <a:pPr lvl="1"/>
             <a:r>
               <a:rPr lang="en-US" dirty="0"/>
-              <a:t>Their portal: </a:t>
-            </a:r>
-            <a:r>
-              <a:rPr lang="en-US" dirty="0">
-                <a:hlinkClick r:id="rId2"/>
-              </a:rPr>
-              <a:t>https://dpi.wi.gov/wisedash</a:t>
-            </a:r>
-            <a:endParaRPr lang="en-US" dirty="0"/>
+              <a:t>Their portal: dpi.wi.gov/wisedash</a:t>
+            </a:r>
           </a:p>
           <a:p>
             <a:r>
@@ -4504,6 +5452,18 @@
             <a:r>
               <a:rPr lang="en-US" dirty="0"/>
               <a:t>See: </a:t>
+            </a:r>
+            <a:r>
+              <a:rPr lang="en-US" dirty="0" err="1"/>
+              <a:t>opportunityatlas.org</a:t>
+            </a:r>
+            <a:endParaRPr lang="en-US" dirty="0"/>
+          </a:p>
+          <a:p>
+            <a:pPr lvl="1"/>
+            <a:r>
+              <a:rPr lang="en-US" dirty="0"/>
+              <a:t>Income, housing data by region and demographic</a:t>
             </a:r>
           </a:p>
         </p:txBody>
@@ -4729,6 +5689,37 @@
                                   </p:childTnLst>
                                 </p:cTn>
                               </p:par>
+                              <p:par>
+                                <p:cTn id="19" presetID="1" presetClass="entr" presetSubtype="0" fill="hold" grpId="0" nodeType="withEffect">
+                                  <p:stCondLst>
+                                    <p:cond delay="0"/>
+                                  </p:stCondLst>
+                                  <p:childTnLst>
+                                    <p:set>
+                                      <p:cBhvr>
+                                        <p:cTn id="20" dur="1" fill="hold">
+                                          <p:stCondLst>
+                                            <p:cond delay="0"/>
+                                          </p:stCondLst>
+                                        </p:cTn>
+                                        <p:tgtEl>
+                                          <p:spTgt spid="3">
+                                            <p:txEl>
+                                              <p:pRg st="5" end="5"/>
+                                            </p:txEl>
+                                          </p:spTgt>
+                                        </p:tgtEl>
+                                        <p:attrNameLst>
+                                          <p:attrName>style.visibility</p:attrName>
+                                        </p:attrNameLst>
+                                      </p:cBhvr>
+                                      <p:to>
+                                        <p:strVal val="visible"/>
+                                      </p:to>
+                                    </p:set>
+                                  </p:childTnLst>
+                                </p:cTn>
+                              </p:par>
                             </p:childTnLst>
                           </p:cTn>
                         </p:par>
@@ -4763,7 +5754,7 @@
 </p:sld>
 </file>
 
-<file path=ppt/slides/slide13.xml><?xml version="1.0" encoding="utf-8"?>
+<file path=ppt/slides/slide15.xml><?xml version="1.0" encoding="utf-8"?>
 <p:sld xmlns:a="http://schemas.openxmlformats.org/drawingml/2006/main" xmlns:r="http://schemas.openxmlformats.org/officeDocument/2006/relationships" xmlns:p="http://schemas.openxmlformats.org/presentationml/2006/main">
   <p:cSld>
     <p:spTree>
@@ -4785,7 +5776,7 @@
           <p:cNvPr id="2" name="Title 1">
             <a:extLst>
               <a:ext uri="{FF2B5EF4-FFF2-40B4-BE49-F238E27FC236}">
-                <a16:creationId xmlns:a16="http://schemas.microsoft.com/office/drawing/2014/main" id="{5FBFFFA4-3F36-1B4C-94D8-0D004CE0100F}"/>
+                <a16:creationId xmlns:a16="http://schemas.microsoft.com/office/drawing/2014/main" id="{B5FE6053-9733-6A4E-9DBA-2210F7398A70}"/>
               </a:ext>
             </a:extLst>
           </p:cNvPr>
@@ -4796,21 +5787,70 @@
             <p:ph type="title"/>
           </p:nvPr>
         </p:nvSpPr>
-        <p:spPr>
-          <a:xfrm>
-            <a:off x="5200650" y="2728118"/>
-            <a:ext cx="628650" cy="1325563"/>
-          </a:xfrm>
-        </p:spPr>
+        <p:spPr/>
+        <p:txBody>
+          <a:bodyPr/>
+          <a:lstStyle/>
+          <a:p>
+            <a:r>
+              <a:rPr lang="en-US" dirty="0"/>
+              <a:t>Articles</a:t>
+            </a:r>
+          </a:p>
+        </p:txBody>
+      </p:sp>
+      <p:sp>
+        <p:nvSpPr>
+          <p:cNvPr id="3" name="Content Placeholder 2">
+            <a:extLst>
+              <a:ext uri="{FF2B5EF4-FFF2-40B4-BE49-F238E27FC236}">
+                <a16:creationId xmlns:a16="http://schemas.microsoft.com/office/drawing/2014/main" id="{335C6569-DC81-2B40-BCD2-A6920B8F4094}"/>
+              </a:ext>
+            </a:extLst>
+          </p:cNvPr>
+          <p:cNvSpPr>
+            <a:spLocks noGrp="1"/>
+          </p:cNvSpPr>
+          <p:nvPr>
+            <p:ph idx="1"/>
+          </p:nvPr>
+        </p:nvSpPr>
+        <p:spPr/>
         <p:txBody>
           <a:bodyPr>
-            <a:noAutofit/>
+            <a:normAutofit/>
           </a:bodyPr>
           <a:lstStyle/>
           <a:p>
             <a:r>
-              <a:rPr lang="en-US" sz="20000" dirty="0"/>
-              <a:t>?</a:t>
+              <a:rPr lang="en-US" dirty="0"/>
+              <a:t>Wisconsin State Journal article "</a:t>
+            </a:r>
+            <a:r>
+              <a:rPr lang="en-US" dirty="0">
+                <a:hlinkClick r:id="rId2"/>
+              </a:rPr>
+              <a:t>Less than half of Wisconsin students in grades 3-8 proficient or better in English, math</a:t>
+            </a:r>
+            <a:r>
+              <a:rPr lang="en-US" dirty="0"/>
+              <a:t>"  (includes interactive district data chart)</a:t>
+            </a:r>
+          </a:p>
+          <a:p>
+            <a:r>
+              <a:rPr lang="en-US" dirty="0"/>
+              <a:t>Journal Sentinel article “</a:t>
+            </a:r>
+            <a:r>
+              <a:rPr lang="en-US" dirty="0">
+                <a:hlinkClick r:id="rId3"/>
+              </a:rPr>
+              <a:t>Fewer than half of Wisconsin students are proficient in math and reading, new test scores show</a:t>
+            </a:r>
+            <a:r>
+              <a:rPr lang="en-US" dirty="0"/>
+              <a:t>”  </a:t>
             </a:r>
           </a:p>
         </p:txBody>
@@ -4818,17 +5858,148 @@
     </p:spTree>
     <p:extLst>
       <p:ext uri="{BB962C8B-B14F-4D97-AF65-F5344CB8AC3E}">
-        <p14:creationId xmlns:p14="http://schemas.microsoft.com/office/powerpoint/2010/main" val="1093596976"/>
+        <p14:creationId xmlns:p14="http://schemas.microsoft.com/office/powerpoint/2010/main" val="2935860489"/>
       </p:ext>
     </p:extLst>
   </p:cSld>
   <p:clrMapOvr>
     <a:masterClrMapping/>
   </p:clrMapOvr>
+  <p:timing>
+    <p:tnLst>
+      <p:par>
+        <p:cTn id="1" dur="indefinite" restart="never" nodeType="tmRoot">
+          <p:childTnLst>
+            <p:seq concurrent="1" nextAc="seek">
+              <p:cTn id="2" dur="indefinite" nodeType="mainSeq">
+                <p:childTnLst>
+                  <p:par>
+                    <p:cTn id="3" fill="hold">
+                      <p:stCondLst>
+                        <p:cond delay="indefinite"/>
+                      </p:stCondLst>
+                      <p:childTnLst>
+                        <p:par>
+                          <p:cTn id="4" fill="hold">
+                            <p:stCondLst>
+                              <p:cond delay="0"/>
+                            </p:stCondLst>
+                            <p:childTnLst>
+                              <p:par>
+                                <p:cTn id="5" presetID="1" presetClass="entr" presetSubtype="0" fill="hold" grpId="0" nodeType="clickEffect">
+                                  <p:stCondLst>
+                                    <p:cond delay="0"/>
+                                  </p:stCondLst>
+                                  <p:childTnLst>
+                                    <p:set>
+                                      <p:cBhvr>
+                                        <p:cTn id="6" dur="1" fill="hold">
+                                          <p:stCondLst>
+                                            <p:cond delay="0"/>
+                                          </p:stCondLst>
+                                        </p:cTn>
+                                        <p:tgtEl>
+                                          <p:spTgt spid="3">
+                                            <p:txEl>
+                                              <p:pRg st="0" end="0"/>
+                                            </p:txEl>
+                                          </p:spTgt>
+                                        </p:tgtEl>
+                                        <p:attrNameLst>
+                                          <p:attrName>style.visibility</p:attrName>
+                                        </p:attrNameLst>
+                                      </p:cBhvr>
+                                      <p:to>
+                                        <p:strVal val="visible"/>
+                                      </p:to>
+                                    </p:set>
+                                  </p:childTnLst>
+                                </p:cTn>
+                              </p:par>
+                            </p:childTnLst>
+                          </p:cTn>
+                        </p:par>
+                      </p:childTnLst>
+                    </p:cTn>
+                  </p:par>
+                  <p:par>
+                    <p:cTn id="7" fill="hold">
+                      <p:stCondLst>
+                        <p:cond delay="indefinite"/>
+                      </p:stCondLst>
+                      <p:childTnLst>
+                        <p:par>
+                          <p:cTn id="8" fill="hold">
+                            <p:stCondLst>
+                              <p:cond delay="0"/>
+                            </p:stCondLst>
+                            <p:childTnLst>
+                              <p:par>
+                                <p:cTn id="9" presetID="1" presetClass="entr" presetSubtype="0" fill="hold" grpId="0" nodeType="clickEffect">
+                                  <p:stCondLst>
+                                    <p:cond delay="0"/>
+                                  </p:stCondLst>
+                                  <p:childTnLst>
+                                    <p:set>
+                                      <p:cBhvr>
+                                        <p:cTn id="10" dur="1" fill="hold">
+                                          <p:stCondLst>
+                                            <p:cond delay="0"/>
+                                          </p:stCondLst>
+                                        </p:cTn>
+                                        <p:tgtEl>
+                                          <p:spTgt spid="3">
+                                            <p:txEl>
+                                              <p:pRg st="1" end="1"/>
+                                            </p:txEl>
+                                          </p:spTgt>
+                                        </p:tgtEl>
+                                        <p:attrNameLst>
+                                          <p:attrName>style.visibility</p:attrName>
+                                        </p:attrNameLst>
+                                      </p:cBhvr>
+                                      <p:to>
+                                        <p:strVal val="visible"/>
+                                      </p:to>
+                                    </p:set>
+                                  </p:childTnLst>
+                                </p:cTn>
+                              </p:par>
+                            </p:childTnLst>
+                          </p:cTn>
+                        </p:par>
+                      </p:childTnLst>
+                    </p:cTn>
+                  </p:par>
+                </p:childTnLst>
+              </p:cTn>
+              <p:prevCondLst>
+                <p:cond evt="onPrev" delay="0">
+                  <p:tgtEl>
+                    <p:sldTgt/>
+                  </p:tgtEl>
+                </p:cond>
+              </p:prevCondLst>
+              <p:nextCondLst>
+                <p:cond evt="onNext" delay="0">
+                  <p:tgtEl>
+                    <p:sldTgt/>
+                  </p:tgtEl>
+                </p:cond>
+              </p:nextCondLst>
+            </p:seq>
+          </p:childTnLst>
+        </p:cTn>
+      </p:par>
+    </p:tnLst>
+    <p:bldLst>
+      <p:bldP spid="3" grpId="0" build="p"/>
+    </p:bldLst>
+  </p:timing>
 </p:sld>
 </file>
 
-<file path=ppt/slides/slide14.xml><?xml version="1.0" encoding="utf-8"?>
+<file path=ppt/slides/slide16.xml><?xml version="1.0" encoding="utf-8"?>
 <p:sld xmlns:a="http://schemas.openxmlformats.org/drawingml/2006/main" xmlns:r="http://schemas.openxmlformats.org/officeDocument/2006/relationships" xmlns:p="http://schemas.openxmlformats.org/presentationml/2006/main">
   <p:cSld>
     <p:spTree>
@@ -4850,6 +6021,202 @@
           <p:cNvPr id="2" name="Title 1">
             <a:extLst>
               <a:ext uri="{FF2B5EF4-FFF2-40B4-BE49-F238E27FC236}">
+                <a16:creationId xmlns:a16="http://schemas.microsoft.com/office/drawing/2014/main" id="{5FBFFFA4-3F36-1B4C-94D8-0D004CE0100F}"/>
+              </a:ext>
+            </a:extLst>
+          </p:cNvPr>
+          <p:cNvSpPr>
+            <a:spLocks noGrp="1"/>
+          </p:cNvSpPr>
+          <p:nvPr>
+            <p:ph type="title"/>
+          </p:nvPr>
+        </p:nvSpPr>
+        <p:spPr>
+          <a:xfrm>
+            <a:off x="4652010" y="3185318"/>
+            <a:ext cx="628650" cy="1325563"/>
+          </a:xfrm>
+        </p:spPr>
+        <p:txBody>
+          <a:bodyPr>
+            <a:noAutofit/>
+          </a:bodyPr>
+          <a:lstStyle/>
+          <a:p>
+            <a:r>
+              <a:rPr lang="en-US" sz="40000" dirty="0"/>
+              <a:t>?</a:t>
+            </a:r>
+          </a:p>
+        </p:txBody>
+      </p:sp>
+    </p:spTree>
+    <p:extLst>
+      <p:ext uri="{BB962C8B-B14F-4D97-AF65-F5344CB8AC3E}">
+        <p14:creationId xmlns:p14="http://schemas.microsoft.com/office/powerpoint/2010/main" val="1093596976"/>
+      </p:ext>
+    </p:extLst>
+  </p:cSld>
+  <p:clrMapOvr>
+    <a:masterClrMapping/>
+  </p:clrMapOvr>
+</p:sld>
+</file>
+
+<file path=ppt/slides/slide17.xml><?xml version="1.0" encoding="utf-8"?>
+<p:sld xmlns:a="http://schemas.openxmlformats.org/drawingml/2006/main" xmlns:r="http://schemas.openxmlformats.org/officeDocument/2006/relationships" xmlns:p="http://schemas.openxmlformats.org/presentationml/2006/main">
+  <p:cSld>
+    <p:spTree>
+      <p:nvGrpSpPr>
+        <p:cNvPr id="1" name=""/>
+        <p:cNvGrpSpPr/>
+        <p:nvPr/>
+      </p:nvGrpSpPr>
+      <p:grpSpPr>
+        <a:xfrm>
+          <a:off x="0" y="0"/>
+          <a:ext cx="0" cy="0"/>
+          <a:chOff x="0" y="0"/>
+          <a:chExt cx="0" cy="0"/>
+        </a:xfrm>
+      </p:grpSpPr>
+      <p:sp>
+        <p:nvSpPr>
+          <p:cNvPr id="2" name="Title 1">
+            <a:extLst>
+              <a:ext uri="{FF2B5EF4-FFF2-40B4-BE49-F238E27FC236}">
+                <a16:creationId xmlns:a16="http://schemas.microsoft.com/office/drawing/2014/main" id="{60653EDE-3B16-7047-811C-6333E0FD522D}"/>
+              </a:ext>
+            </a:extLst>
+          </p:cNvPr>
+          <p:cNvSpPr>
+            <a:spLocks noGrp="1"/>
+          </p:cNvSpPr>
+          <p:nvPr>
+            <p:ph type="title"/>
+          </p:nvPr>
+        </p:nvSpPr>
+        <p:spPr>
+          <a:xfrm>
+            <a:off x="592666" y="918103"/>
+            <a:ext cx="11006667" cy="1325563"/>
+          </a:xfrm>
+        </p:spPr>
+        <p:txBody>
+          <a:bodyPr>
+            <a:noAutofit/>
+          </a:bodyPr>
+          <a:lstStyle/>
+          <a:p>
+            <a:r>
+              <a:rPr lang="en-US" sz="15000" dirty="0"/>
+              <a:t>Thank you!</a:t>
+            </a:r>
+          </a:p>
+        </p:txBody>
+      </p:sp>
+      <p:sp>
+        <p:nvSpPr>
+          <p:cNvPr id="4" name="Title 1">
+            <a:extLst>
+              <a:ext uri="{FF2B5EF4-FFF2-40B4-BE49-F238E27FC236}">
+                <a16:creationId xmlns:a16="http://schemas.microsoft.com/office/drawing/2014/main" id="{611E3CCF-849D-8448-9F4A-B77D688985E9}"/>
+              </a:ext>
+            </a:extLst>
+          </p:cNvPr>
+          <p:cNvSpPr txBox="1">
+            <a:spLocks/>
+          </p:cNvSpPr>
+          <p:nvPr/>
+        </p:nvSpPr>
+        <p:spPr>
+          <a:xfrm>
+            <a:off x="4631266" y="4880505"/>
+            <a:ext cx="7560734" cy="1808162"/>
+          </a:xfrm>
+          <a:prstGeom prst="rect">
+            <a:avLst/>
+          </a:prstGeom>
+        </p:spPr>
+        <p:txBody>
+          <a:bodyPr vert="horz" lIns="91440" tIns="45720" rIns="91440" bIns="45720" rtlCol="0" anchor="ctr">
+            <a:normAutofit fontScale="85000" lnSpcReduction="10000"/>
+          </a:bodyPr>
+          <a:lstStyle>
+            <a:lvl1pPr algn="l" defTabSz="914400" rtl="0" eaLnBrk="1" latinLnBrk="0" hangingPunct="1">
+              <a:lnSpc>
+                <a:spcPct val="90000"/>
+              </a:lnSpc>
+              <a:spcBef>
+                <a:spcPct val="0"/>
+              </a:spcBef>
+              <a:buNone/>
+              <a:defRPr sz="4400" kern="1200">
+                <a:solidFill>
+                  <a:schemeClr val="tx1"/>
+                </a:solidFill>
+                <a:latin typeface="+mj-lt"/>
+                <a:ea typeface="+mj-ea"/>
+                <a:cs typeface="+mj-cs"/>
+              </a:defRPr>
+            </a:lvl1pPr>
+          </a:lstStyle>
+          <a:p>
+            <a:r>
+              <a:rPr lang="en-US" dirty="0"/>
+              <a:t>Contact:</a:t>
+            </a:r>
+          </a:p>
+          <a:p>
+            <a:r>
+              <a:rPr lang="en-US" dirty="0"/>
+              <a:t>	cooperborken@wisc.edu (Matt)</a:t>
+            </a:r>
+          </a:p>
+          <a:p>
+            <a:r>
+              <a:rPr lang="en-US" dirty="0"/>
+              <a:t>	liz@wisconsinliteracy.org (Liz)</a:t>
+            </a:r>
+          </a:p>
+        </p:txBody>
+      </p:sp>
+    </p:spTree>
+    <p:extLst>
+      <p:ext uri="{BB962C8B-B14F-4D97-AF65-F5344CB8AC3E}">
+        <p14:creationId xmlns:p14="http://schemas.microsoft.com/office/powerpoint/2010/main" val="617270022"/>
+      </p:ext>
+    </p:extLst>
+  </p:cSld>
+  <p:clrMapOvr>
+    <a:masterClrMapping/>
+  </p:clrMapOvr>
+</p:sld>
+</file>
+
+<file path=ppt/slides/slide18.xml><?xml version="1.0" encoding="utf-8"?>
+<p:sld xmlns:a="http://schemas.openxmlformats.org/drawingml/2006/main" xmlns:r="http://schemas.openxmlformats.org/officeDocument/2006/relationships" xmlns:p="http://schemas.openxmlformats.org/presentationml/2006/main">
+  <p:cSld>
+    <p:spTree>
+      <p:nvGrpSpPr>
+        <p:cNvPr id="1" name=""/>
+        <p:cNvGrpSpPr/>
+        <p:nvPr/>
+      </p:nvGrpSpPr>
+      <p:grpSpPr>
+        <a:xfrm>
+          <a:off x="0" y="0"/>
+          <a:ext cx="0" cy="0"/>
+          <a:chOff x="0" y="0"/>
+          <a:chExt cx="0" cy="0"/>
+        </a:xfrm>
+      </p:grpSpPr>
+      <p:sp>
+        <p:nvSpPr>
+          <p:cNvPr id="2" name="Title 1">
+            <a:extLst>
+              <a:ext uri="{FF2B5EF4-FFF2-40B4-BE49-F238E27FC236}">
                 <a16:creationId xmlns:a16="http://schemas.microsoft.com/office/drawing/2014/main" id="{AA31B201-C41D-2C4D-BB86-0FB39A76F561}"/>
               </a:ext>
             </a:extLst>
@@ -4896,7 +6263,7 @@
         </p:nvSpPr>
         <p:spPr>
           <a:xfrm>
-            <a:off x="25402" y="1675128"/>
+            <a:off x="162562" y="2132328"/>
             <a:ext cx="11861798" cy="2428872"/>
           </a:xfrm>
           <a:prstGeom prst="rect">
@@ -4929,32 +6296,41 @@
           <a:p>
             <a:pPr indent="-457200"/>
             <a:r>
-              <a:rPr lang="en-US" sz="2800" dirty="0"/>
-              <a:t>        </a:t>
-            </a:r>
-            <a:r>
-              <a:rPr lang="en-US" sz="2800" dirty="0" err="1"/>
-              <a:t>Baydar</a:t>
-            </a:r>
-            <a:r>
-              <a:rPr lang="en-US" sz="2800" dirty="0"/>
-              <a:t>, N., Brooks‐Gunn, J., &amp; Furstenberg, F. F. (1993). Early warning signs of functional illiteracy: Predictors in childhood and adolescence. </a:t>
-            </a:r>
-            <a:r>
-              <a:rPr lang="en-US" sz="2800" i="1" dirty="0"/>
-              <a:t>Child development</a:t>
-            </a:r>
-            <a:r>
-              <a:rPr lang="en-US" sz="2800" dirty="0"/>
-              <a:t>, </a:t>
-            </a:r>
-            <a:r>
-              <a:rPr lang="en-US" sz="2800" i="1" dirty="0"/>
-              <a:t>64</a:t>
-            </a:r>
-            <a:r>
-              <a:rPr lang="en-US" sz="2800" dirty="0"/>
-              <a:t>(3), 815-829.</a:t>
+              <a:rPr lang="en-US" sz="2500" dirty="0"/>
+              <a:t>Baer, J., </a:t>
+            </a:r>
+            <a:r>
+              <a:rPr lang="en-US" sz="2500" dirty="0" err="1"/>
+              <a:t>Kutner</a:t>
+            </a:r>
+            <a:r>
+              <a:rPr lang="en-US" sz="2500" dirty="0"/>
+              <a:t>, M., Sabatini, J., &amp; White, S. (2009). Basic Reading Skills and the Literacy</a:t>
+            </a:r>
+          </a:p>
+          <a:p>
+            <a:pPr indent="-457200"/>
+            <a:r>
+              <a:rPr lang="en-US" sz="2500" dirty="0"/>
+              <a:t>     of America's Least Literate Adults: Results from the 2003 National Assessment of</a:t>
+            </a:r>
+          </a:p>
+          <a:p>
+            <a:pPr indent="-457200"/>
+            <a:r>
+              <a:rPr lang="en-US" sz="2500" dirty="0"/>
+              <a:t>     Adult Literacy (NAAL) Supplemental Studies. NCES 2009-481. </a:t>
+            </a:r>
+            <a:r>
+              <a:rPr lang="en-US" sz="2500" i="1" dirty="0"/>
+              <a:t>National Center for</a:t>
+            </a:r>
+          </a:p>
+          <a:p>
+            <a:pPr indent="-457200"/>
+            <a:r>
+              <a:rPr lang="en-US" sz="2500" i="1" dirty="0"/>
+              <a:t>     Education Statistics.</a:t>
             </a:r>
           </a:p>
           <a:p>
@@ -4964,16 +6340,128 @@
               </a:spcBef>
             </a:pPr>
             <a:r>
-              <a:rPr lang="en-US" sz="2800" dirty="0"/>
-              <a:t>         National Reading Panel (US), National Institute of Child Health, &amp; Human Development (US). (2000). </a:t>
-            </a:r>
-            <a:r>
-              <a:rPr lang="en-US" sz="2800" i="1" dirty="0"/>
-              <a:t>Report of the National Reading Panel: Teaching children to read: An evidence-based assessment of the scientific research literature on reading and its implications for reading instruction: Reports of the subgroups</a:t>
-            </a:r>
-            <a:r>
-              <a:rPr lang="en-US" sz="2800" dirty="0"/>
-              <a:t>. National Institute of Child Health and Human Development, National Institutes of Health.</a:t>
+              <a:rPr lang="en-US" sz="2500" dirty="0" err="1"/>
+              <a:t>Baydar</a:t>
+            </a:r>
+            <a:r>
+              <a:rPr lang="en-US" sz="2500" dirty="0"/>
+              <a:t>, N., Brooks‐Gunn, J., &amp; Furstenberg, F. (1993). Early warning signs of functional</a:t>
+            </a:r>
+          </a:p>
+          <a:p>
+            <a:pPr indent="-457200"/>
+            <a:r>
+              <a:rPr lang="en-US" sz="2500" dirty="0"/>
+              <a:t>     illiteracy: Predictors in childhood and adolescence. </a:t>
+            </a:r>
+            <a:r>
+              <a:rPr lang="en-US" sz="2500" i="1" dirty="0"/>
+              <a:t>Child development</a:t>
+            </a:r>
+            <a:r>
+              <a:rPr lang="en-US" sz="2500" dirty="0"/>
+              <a:t>, </a:t>
+            </a:r>
+            <a:r>
+              <a:rPr lang="en-US" sz="2500" i="1" dirty="0"/>
+              <a:t>64</a:t>
+            </a:r>
+            <a:r>
+              <a:rPr lang="en-US" sz="2500" dirty="0"/>
+              <a:t>(3), 815-829.</a:t>
+            </a:r>
+          </a:p>
+          <a:p>
+            <a:pPr indent="-457200">
+              <a:spcBef>
+                <a:spcPts val="600"/>
+              </a:spcBef>
+            </a:pPr>
+            <a:r>
+              <a:rPr lang="en-US" sz="2500" dirty="0"/>
+              <a:t>National Reading Panel (US), National Institute of Child Health, &amp; Human Development</a:t>
+            </a:r>
+          </a:p>
+          <a:p>
+            <a:pPr indent="-457200">
+              <a:spcBef>
+                <a:spcPts val="0"/>
+              </a:spcBef>
+            </a:pPr>
+            <a:r>
+              <a:rPr lang="en-US" sz="2500" dirty="0"/>
+              <a:t>     (US). (2000). </a:t>
+            </a:r>
+            <a:r>
+              <a:rPr lang="en-US" sz="2500" i="1" dirty="0"/>
+              <a:t>Report of the National Reading Panel: Teaching children to read: An</a:t>
+            </a:r>
+          </a:p>
+          <a:p>
+            <a:pPr indent="-457200">
+              <a:spcBef>
+                <a:spcPts val="0"/>
+              </a:spcBef>
+            </a:pPr>
+            <a:r>
+              <a:rPr lang="en-US" sz="2500" i="1" dirty="0"/>
+              <a:t>     evidence-based assessment of the scientific research literature on reading and its</a:t>
+            </a:r>
+          </a:p>
+          <a:p>
+            <a:pPr indent="-457200">
+              <a:spcBef>
+                <a:spcPts val="0"/>
+              </a:spcBef>
+            </a:pPr>
+            <a:r>
+              <a:rPr lang="en-US" sz="2500" i="1" dirty="0"/>
+              <a:t>     implications for reading instruction: Reports of the subgroups</a:t>
+            </a:r>
+            <a:r>
+              <a:rPr lang="en-US" sz="2500" dirty="0"/>
+              <a:t>. National Institute of Child</a:t>
+            </a:r>
+          </a:p>
+          <a:p>
+            <a:pPr indent="-457200">
+              <a:spcBef>
+                <a:spcPts val="0"/>
+              </a:spcBef>
+            </a:pPr>
+            <a:r>
+              <a:rPr lang="en-US" sz="2500" dirty="0"/>
+              <a:t>     Health and Human Development, National Institutes of Health.</a:t>
+            </a:r>
+          </a:p>
+          <a:p>
+            <a:pPr indent="-457200">
+              <a:spcBef>
+                <a:spcPts val="600"/>
+              </a:spcBef>
+            </a:pPr>
+            <a:r>
+              <a:rPr lang="en-US" sz="2500" dirty="0"/>
+              <a:t>Seidenberg, M. (2017). </a:t>
+            </a:r>
+            <a:r>
+              <a:rPr lang="en-US" sz="2500" i="1" dirty="0"/>
+              <a:t>Language at the speed of sight: How we read, why so many can’t,</a:t>
+            </a:r>
+          </a:p>
+          <a:p>
+            <a:pPr indent="-457200">
+              <a:spcBef>
+                <a:spcPts val="0"/>
+              </a:spcBef>
+            </a:pPr>
+            <a:r>
+              <a:rPr lang="en-US" sz="2500" i="1" dirty="0"/>
+              <a:t>     and what can be done about it</a:t>
+            </a:r>
+            <a:r>
+              <a:rPr lang="en-US" sz="2500" dirty="0"/>
+              <a:t>. New York: Basic Books.</a:t>
             </a:r>
           </a:p>
         </p:txBody>
@@ -5036,31 +6524,126 @@
           </a:p>
         </p:txBody>
       </p:sp>
-      <p:sp>
-        <p:nvSpPr>
-          <p:cNvPr id="3" name="Content Placeholder 2">
-            <a:extLst>
-              <a:ext uri="{FF2B5EF4-FFF2-40B4-BE49-F238E27FC236}">
-                <a16:creationId xmlns:a16="http://schemas.microsoft.com/office/drawing/2014/main" id="{79043483-6A70-B349-A0CC-98EBE670E45B}"/>
-              </a:ext>
-            </a:extLst>
-          </p:cNvPr>
-          <p:cNvSpPr>
-            <a:spLocks noGrp="1"/>
-          </p:cNvSpPr>
-          <p:nvPr>
-            <p:ph idx="1"/>
-          </p:nvPr>
-        </p:nvSpPr>
-        <p:spPr/>
-        <p:txBody>
-          <a:bodyPr/>
-          <a:lstStyle/>
-          <a:p>
-            <a:endParaRPr lang="en-US"/>
-          </a:p>
-        </p:txBody>
-      </p:sp>
+      <p:pic>
+        <p:nvPicPr>
+          <p:cNvPr id="5" name="Picture 4" descr="A screenshot of a social media post&#10;&#10;Description automatically generated">
+            <a:extLst>
+              <a:ext uri="{FF2B5EF4-FFF2-40B4-BE49-F238E27FC236}">
+                <a16:creationId xmlns:a16="http://schemas.microsoft.com/office/drawing/2014/main" id="{E0DD26B2-F5D7-D140-AF3D-0A3E10C52438}"/>
+              </a:ext>
+            </a:extLst>
+          </p:cNvPr>
+          <p:cNvPicPr>
+            <a:picLocks noChangeAspect="1"/>
+          </p:cNvPicPr>
+          <p:nvPr/>
+        </p:nvPicPr>
+        <p:blipFill>
+          <a:blip r:embed="rId2"/>
+          <a:stretch>
+            <a:fillRect/>
+          </a:stretch>
+        </p:blipFill>
+        <p:spPr>
+          <a:xfrm>
+            <a:off x="586154" y="1497253"/>
+            <a:ext cx="5509846" cy="2750494"/>
+          </a:xfrm>
+          <a:prstGeom prst="rect">
+            <a:avLst/>
+          </a:prstGeom>
+        </p:spPr>
+      </p:pic>
+      <p:pic>
+        <p:nvPicPr>
+          <p:cNvPr id="7" name="Picture 6" descr="A screenshot of a social media post&#10;&#10;Description automatically generated">
+            <a:extLst>
+              <a:ext uri="{FF2B5EF4-FFF2-40B4-BE49-F238E27FC236}">
+                <a16:creationId xmlns:a16="http://schemas.microsoft.com/office/drawing/2014/main" id="{4262453F-8776-5C48-9552-C0260C28B390}"/>
+              </a:ext>
+            </a:extLst>
+          </p:cNvPr>
+          <p:cNvPicPr>
+            <a:picLocks noChangeAspect="1"/>
+          </p:cNvPicPr>
+          <p:nvPr/>
+        </p:nvPicPr>
+        <p:blipFill>
+          <a:blip r:embed="rId3"/>
+          <a:stretch>
+            <a:fillRect/>
+          </a:stretch>
+        </p:blipFill>
+        <p:spPr>
+          <a:xfrm>
+            <a:off x="6568749" y="1959275"/>
+            <a:ext cx="5318451" cy="2904127"/>
+          </a:xfrm>
+          <a:prstGeom prst="rect">
+            <a:avLst/>
+          </a:prstGeom>
+        </p:spPr>
+      </p:pic>
+      <p:pic>
+        <p:nvPicPr>
+          <p:cNvPr id="9" name="Picture 8">
+            <a:extLst>
+              <a:ext uri="{FF2B5EF4-FFF2-40B4-BE49-F238E27FC236}">
+                <a16:creationId xmlns:a16="http://schemas.microsoft.com/office/drawing/2014/main" id="{9024E6EE-BDA6-F445-9563-03B606214F7A}"/>
+              </a:ext>
+            </a:extLst>
+          </p:cNvPr>
+          <p:cNvPicPr>
+            <a:picLocks noChangeAspect="1"/>
+          </p:cNvPicPr>
+          <p:nvPr/>
+        </p:nvPicPr>
+        <p:blipFill>
+          <a:blip r:embed="rId4"/>
+          <a:stretch>
+            <a:fillRect/>
+          </a:stretch>
+        </p:blipFill>
+        <p:spPr>
+          <a:xfrm>
+            <a:off x="2004890" y="4992623"/>
+            <a:ext cx="2672373" cy="915708"/>
+          </a:xfrm>
+          <a:prstGeom prst="rect">
+            <a:avLst/>
+          </a:prstGeom>
+        </p:spPr>
+      </p:pic>
+      <p:pic>
+        <p:nvPicPr>
+          <p:cNvPr id="11" name="Picture 10" descr="A picture containing indoor&#10;&#10;Description automatically generated">
+            <a:extLst>
+              <a:ext uri="{FF2B5EF4-FFF2-40B4-BE49-F238E27FC236}">
+                <a16:creationId xmlns:a16="http://schemas.microsoft.com/office/drawing/2014/main" id="{890531E8-F86A-A643-A239-2212788B4AAA}"/>
+              </a:ext>
+            </a:extLst>
+          </p:cNvPr>
+          <p:cNvPicPr>
+            <a:picLocks noChangeAspect="1"/>
+          </p:cNvPicPr>
+          <p:nvPr/>
+        </p:nvPicPr>
+        <p:blipFill>
+          <a:blip r:embed="rId5"/>
+          <a:stretch>
+            <a:fillRect/>
+          </a:stretch>
+        </p:blipFill>
+        <p:spPr>
+          <a:xfrm>
+            <a:off x="5280720" y="5450477"/>
+            <a:ext cx="5311492" cy="803419"/>
+          </a:xfrm>
+          <a:prstGeom prst="rect">
+            <a:avLst/>
+          </a:prstGeom>
+        </p:spPr>
+      </p:pic>
     </p:spTree>
     <p:extLst>
       <p:ext uri="{BB962C8B-B14F-4D97-AF65-F5344CB8AC3E}">
@@ -5071,6 +6654,364 @@
   <p:clrMapOvr>
     <a:masterClrMapping/>
   </p:clrMapOvr>
+  <p:timing>
+    <p:tnLst>
+      <p:par>
+        <p:cTn id="1" dur="indefinite" restart="never" nodeType="tmRoot">
+          <p:childTnLst>
+            <p:seq concurrent="1" nextAc="seek">
+              <p:cTn id="2" dur="indefinite" nodeType="mainSeq">
+                <p:childTnLst>
+                  <p:par>
+                    <p:cTn id="3" fill="hold">
+                      <p:stCondLst>
+                        <p:cond delay="indefinite"/>
+                      </p:stCondLst>
+                      <p:childTnLst>
+                        <p:par>
+                          <p:cTn id="4" fill="hold">
+                            <p:stCondLst>
+                              <p:cond delay="0"/>
+                            </p:stCondLst>
+                            <p:childTnLst>
+                              <p:par>
+                                <p:cTn id="5" presetID="2" presetClass="entr" presetSubtype="4" fill="hold" nodeType="clickEffect">
+                                  <p:stCondLst>
+                                    <p:cond delay="0"/>
+                                  </p:stCondLst>
+                                  <p:childTnLst>
+                                    <p:set>
+                                      <p:cBhvr>
+                                        <p:cTn id="6" dur="1" fill="hold">
+                                          <p:stCondLst>
+                                            <p:cond delay="0"/>
+                                          </p:stCondLst>
+                                        </p:cTn>
+                                        <p:tgtEl>
+                                          <p:spTgt spid="5"/>
+                                        </p:tgtEl>
+                                        <p:attrNameLst>
+                                          <p:attrName>style.visibility</p:attrName>
+                                        </p:attrNameLst>
+                                      </p:cBhvr>
+                                      <p:to>
+                                        <p:strVal val="visible"/>
+                                      </p:to>
+                                    </p:set>
+                                    <p:anim calcmode="lin" valueType="num">
+                                      <p:cBhvr additive="base">
+                                        <p:cTn id="7" dur="500" fill="hold"/>
+                                        <p:tgtEl>
+                                          <p:spTgt spid="5"/>
+                                        </p:tgtEl>
+                                        <p:attrNameLst>
+                                          <p:attrName>ppt_x</p:attrName>
+                                        </p:attrNameLst>
+                                      </p:cBhvr>
+                                      <p:tavLst>
+                                        <p:tav tm="0">
+                                          <p:val>
+                                            <p:strVal val="#ppt_x"/>
+                                          </p:val>
+                                        </p:tav>
+                                        <p:tav tm="100000">
+                                          <p:val>
+                                            <p:strVal val="#ppt_x"/>
+                                          </p:val>
+                                        </p:tav>
+                                      </p:tavLst>
+                                    </p:anim>
+                                    <p:anim calcmode="lin" valueType="num">
+                                      <p:cBhvr additive="base">
+                                        <p:cTn id="8" dur="500" fill="hold"/>
+                                        <p:tgtEl>
+                                          <p:spTgt spid="5"/>
+                                        </p:tgtEl>
+                                        <p:attrNameLst>
+                                          <p:attrName>ppt_y</p:attrName>
+                                        </p:attrNameLst>
+                                      </p:cBhvr>
+                                      <p:tavLst>
+                                        <p:tav tm="0">
+                                          <p:val>
+                                            <p:strVal val="1+#ppt_h/2"/>
+                                          </p:val>
+                                        </p:tav>
+                                        <p:tav tm="100000">
+                                          <p:val>
+                                            <p:strVal val="#ppt_y"/>
+                                          </p:val>
+                                        </p:tav>
+                                      </p:tavLst>
+                                    </p:anim>
+                                  </p:childTnLst>
+                                </p:cTn>
+                              </p:par>
+                              <p:par>
+                                <p:cTn id="9" presetID="2" presetClass="entr" presetSubtype="4" fill="hold" nodeType="withEffect">
+                                  <p:stCondLst>
+                                    <p:cond delay="0"/>
+                                  </p:stCondLst>
+                                  <p:childTnLst>
+                                    <p:set>
+                                      <p:cBhvr>
+                                        <p:cTn id="10" dur="1" fill="hold">
+                                          <p:stCondLst>
+                                            <p:cond delay="0"/>
+                                          </p:stCondLst>
+                                        </p:cTn>
+                                        <p:tgtEl>
+                                          <p:spTgt spid="7"/>
+                                        </p:tgtEl>
+                                        <p:attrNameLst>
+                                          <p:attrName>style.visibility</p:attrName>
+                                        </p:attrNameLst>
+                                      </p:cBhvr>
+                                      <p:to>
+                                        <p:strVal val="visible"/>
+                                      </p:to>
+                                    </p:set>
+                                    <p:anim calcmode="lin" valueType="num">
+                                      <p:cBhvr additive="base">
+                                        <p:cTn id="11" dur="500" fill="hold"/>
+                                        <p:tgtEl>
+                                          <p:spTgt spid="7"/>
+                                        </p:tgtEl>
+                                        <p:attrNameLst>
+                                          <p:attrName>ppt_x</p:attrName>
+                                        </p:attrNameLst>
+                                      </p:cBhvr>
+                                      <p:tavLst>
+                                        <p:tav tm="0">
+                                          <p:val>
+                                            <p:strVal val="#ppt_x"/>
+                                          </p:val>
+                                        </p:tav>
+                                        <p:tav tm="100000">
+                                          <p:val>
+                                            <p:strVal val="#ppt_x"/>
+                                          </p:val>
+                                        </p:tav>
+                                      </p:tavLst>
+                                    </p:anim>
+                                    <p:anim calcmode="lin" valueType="num">
+                                      <p:cBhvr additive="base">
+                                        <p:cTn id="12" dur="500" fill="hold"/>
+                                        <p:tgtEl>
+                                          <p:spTgt spid="7"/>
+                                        </p:tgtEl>
+                                        <p:attrNameLst>
+                                          <p:attrName>ppt_y</p:attrName>
+                                        </p:attrNameLst>
+                                      </p:cBhvr>
+                                      <p:tavLst>
+                                        <p:tav tm="0">
+                                          <p:val>
+                                            <p:strVal val="1+#ppt_h/2"/>
+                                          </p:val>
+                                        </p:tav>
+                                        <p:tav tm="100000">
+                                          <p:val>
+                                            <p:strVal val="#ppt_y"/>
+                                          </p:val>
+                                        </p:tav>
+                                      </p:tavLst>
+                                    </p:anim>
+                                  </p:childTnLst>
+                                </p:cTn>
+                              </p:par>
+                            </p:childTnLst>
+                          </p:cTn>
+                        </p:par>
+                      </p:childTnLst>
+                    </p:cTn>
+                  </p:par>
+                  <p:par>
+                    <p:cTn id="13" fill="hold">
+                      <p:stCondLst>
+                        <p:cond delay="indefinite"/>
+                      </p:stCondLst>
+                      <p:childTnLst>
+                        <p:par>
+                          <p:cTn id="14" fill="hold">
+                            <p:stCondLst>
+                              <p:cond delay="0"/>
+                            </p:stCondLst>
+                            <p:childTnLst>
+                              <p:par>
+                                <p:cTn id="15" presetID="2" presetClass="entr" presetSubtype="4" fill="hold" nodeType="clickEffect">
+                                  <p:stCondLst>
+                                    <p:cond delay="0"/>
+                                  </p:stCondLst>
+                                  <p:childTnLst>
+                                    <p:set>
+                                      <p:cBhvr>
+                                        <p:cTn id="16" dur="1" fill="hold">
+                                          <p:stCondLst>
+                                            <p:cond delay="0"/>
+                                          </p:stCondLst>
+                                        </p:cTn>
+                                        <p:tgtEl>
+                                          <p:spTgt spid="9"/>
+                                        </p:tgtEl>
+                                        <p:attrNameLst>
+                                          <p:attrName>style.visibility</p:attrName>
+                                        </p:attrNameLst>
+                                      </p:cBhvr>
+                                      <p:to>
+                                        <p:strVal val="visible"/>
+                                      </p:to>
+                                    </p:set>
+                                    <p:anim calcmode="lin" valueType="num">
+                                      <p:cBhvr additive="base">
+                                        <p:cTn id="17" dur="500" fill="hold"/>
+                                        <p:tgtEl>
+                                          <p:spTgt spid="9"/>
+                                        </p:tgtEl>
+                                        <p:attrNameLst>
+                                          <p:attrName>ppt_x</p:attrName>
+                                        </p:attrNameLst>
+                                      </p:cBhvr>
+                                      <p:tavLst>
+                                        <p:tav tm="0">
+                                          <p:val>
+                                            <p:strVal val="#ppt_x"/>
+                                          </p:val>
+                                        </p:tav>
+                                        <p:tav tm="100000">
+                                          <p:val>
+                                            <p:strVal val="#ppt_x"/>
+                                          </p:val>
+                                        </p:tav>
+                                      </p:tavLst>
+                                    </p:anim>
+                                    <p:anim calcmode="lin" valueType="num">
+                                      <p:cBhvr additive="base">
+                                        <p:cTn id="18" dur="500" fill="hold"/>
+                                        <p:tgtEl>
+                                          <p:spTgt spid="9"/>
+                                        </p:tgtEl>
+                                        <p:attrNameLst>
+                                          <p:attrName>ppt_y</p:attrName>
+                                        </p:attrNameLst>
+                                      </p:cBhvr>
+                                      <p:tavLst>
+                                        <p:tav tm="0">
+                                          <p:val>
+                                            <p:strVal val="1+#ppt_h/2"/>
+                                          </p:val>
+                                        </p:tav>
+                                        <p:tav tm="100000">
+                                          <p:val>
+                                            <p:strVal val="#ppt_y"/>
+                                          </p:val>
+                                        </p:tav>
+                                      </p:tavLst>
+                                    </p:anim>
+                                  </p:childTnLst>
+                                </p:cTn>
+                              </p:par>
+                              <p:par>
+                                <p:cTn id="19" presetID="2" presetClass="entr" presetSubtype="4" fill="hold" nodeType="withEffect">
+                                  <p:stCondLst>
+                                    <p:cond delay="0"/>
+                                  </p:stCondLst>
+                                  <p:childTnLst>
+                                    <p:set>
+                                      <p:cBhvr>
+                                        <p:cTn id="20" dur="1" fill="hold">
+                                          <p:stCondLst>
+                                            <p:cond delay="0"/>
+                                          </p:stCondLst>
+                                        </p:cTn>
+                                        <p:tgtEl>
+                                          <p:spTgt spid="11"/>
+                                        </p:tgtEl>
+                                        <p:attrNameLst>
+                                          <p:attrName>style.visibility</p:attrName>
+                                        </p:attrNameLst>
+                                      </p:cBhvr>
+                                      <p:to>
+                                        <p:strVal val="visible"/>
+                                      </p:to>
+                                    </p:set>
+                                    <p:anim calcmode="lin" valueType="num">
+                                      <p:cBhvr additive="base">
+                                        <p:cTn id="21" dur="500" fill="hold"/>
+                                        <p:tgtEl>
+                                          <p:spTgt spid="11"/>
+                                        </p:tgtEl>
+                                        <p:attrNameLst>
+                                          <p:attrName>ppt_x</p:attrName>
+                                        </p:attrNameLst>
+                                      </p:cBhvr>
+                                      <p:tavLst>
+                                        <p:tav tm="0">
+                                          <p:val>
+                                            <p:strVal val="#ppt_x"/>
+                                          </p:val>
+                                        </p:tav>
+                                        <p:tav tm="100000">
+                                          <p:val>
+                                            <p:strVal val="#ppt_x"/>
+                                          </p:val>
+                                        </p:tav>
+                                      </p:tavLst>
+                                    </p:anim>
+                                    <p:anim calcmode="lin" valueType="num">
+                                      <p:cBhvr additive="base">
+                                        <p:cTn id="22" dur="500" fill="hold"/>
+                                        <p:tgtEl>
+                                          <p:spTgt spid="11"/>
+                                        </p:tgtEl>
+                                        <p:attrNameLst>
+                                          <p:attrName>ppt_y</p:attrName>
+                                        </p:attrNameLst>
+                                      </p:cBhvr>
+                                      <p:tavLst>
+                                        <p:tav tm="0">
+                                          <p:val>
+                                            <p:strVal val="1+#ppt_h/2"/>
+                                          </p:val>
+                                        </p:tav>
+                                        <p:tav tm="100000">
+                                          <p:val>
+                                            <p:strVal val="#ppt_y"/>
+                                          </p:val>
+                                        </p:tav>
+                                      </p:tavLst>
+                                    </p:anim>
+                                  </p:childTnLst>
+                                </p:cTn>
+                              </p:par>
+                            </p:childTnLst>
+                          </p:cTn>
+                        </p:par>
+                      </p:childTnLst>
+                    </p:cTn>
+                  </p:par>
+                </p:childTnLst>
+              </p:cTn>
+              <p:prevCondLst>
+                <p:cond evt="onPrev" delay="0">
+                  <p:tgtEl>
+                    <p:sldTgt/>
+                  </p:tgtEl>
+                </p:cond>
+              </p:prevCondLst>
+              <p:nextCondLst>
+                <p:cond evt="onNext" delay="0">
+                  <p:tgtEl>
+                    <p:sldTgt/>
+                  </p:tgtEl>
+                </p:cond>
+              </p:nextCondLst>
+            </p:seq>
+          </p:childTnLst>
+        </p:cTn>
+      </p:par>
+    </p:tnLst>
+  </p:timing>
 </p:sld>
 </file>
 
@@ -5135,7 +7076,12 @@
             <p:ph idx="1"/>
           </p:nvPr>
         </p:nvSpPr>
-        <p:spPr/>
+        <p:spPr>
+          <a:xfrm>
+            <a:off x="838200" y="1825625"/>
+            <a:ext cx="10515600" cy="4351338"/>
+          </a:xfrm>
+        </p:spPr>
         <p:txBody>
           <a:bodyPr/>
           <a:lstStyle/>
@@ -5156,7 +7102,7 @@
             <a:pPr lvl="1"/>
             <a:r>
               <a:rPr lang="en-US" dirty="0"/>
-              <a:t>Reporting to shareholders</a:t>
+              <a:t>Reporting to stakeholders</a:t>
             </a:r>
           </a:p>
           <a:p>
@@ -5181,7 +7127,13 @@
           <a:p>
             <a:r>
               <a:rPr lang="en-US" dirty="0"/>
-              <a:t>Packaged it up in an online tool for you</a:t>
+              <a:t>Packaged it in an online interactive tool for you</a:t>
+            </a:r>
+          </a:p>
+          <a:p>
+            <a:r>
+              <a:rPr lang="en-US" dirty="0"/>
+              <a:t>Along with other resources</a:t>
             </a:r>
           </a:p>
           <a:p>
@@ -5495,7 +7447,7 @@
                             </p:stCondLst>
                             <p:childTnLst>
                               <p:par>
-                                <p:cTn id="25" presetID="1" presetClass="entr" presetSubtype="0" fill="hold" nodeType="clickEffect">
+                                <p:cTn id="25" presetID="2" presetClass="entr" presetSubtype="4" fill="hold" nodeType="clickEffect">
                                   <p:stCondLst>
                                     <p:cond delay="0"/>
                                   </p:stCondLst>
@@ -5503,6 +7455,97 @@
                                     <p:set>
                                       <p:cBhvr>
                                         <p:cTn id="26" dur="1" fill="hold">
+                                          <p:stCondLst>
+                                            <p:cond delay="0"/>
+                                          </p:stCondLst>
+                                        </p:cTn>
+                                        <p:tgtEl>
+                                          <p:spTgt spid="5"/>
+                                        </p:tgtEl>
+                                        <p:attrNameLst>
+                                          <p:attrName>style.visibility</p:attrName>
+                                        </p:attrNameLst>
+                                      </p:cBhvr>
+                                      <p:to>
+                                        <p:strVal val="visible"/>
+                                      </p:to>
+                                    </p:set>
+                                    <p:anim calcmode="lin" valueType="num">
+                                      <p:cBhvr additive="base">
+                                        <p:cTn id="27" dur="500" fill="hold"/>
+                                        <p:tgtEl>
+                                          <p:spTgt spid="5"/>
+                                        </p:tgtEl>
+                                        <p:attrNameLst>
+                                          <p:attrName>ppt_x</p:attrName>
+                                        </p:attrNameLst>
+                                      </p:cBhvr>
+                                      <p:tavLst>
+                                        <p:tav tm="0">
+                                          <p:val>
+                                            <p:strVal val="#ppt_x"/>
+                                          </p:val>
+                                        </p:tav>
+                                        <p:tav tm="100000">
+                                          <p:val>
+                                            <p:strVal val="#ppt_x"/>
+                                          </p:val>
+                                        </p:tav>
+                                      </p:tavLst>
+                                    </p:anim>
+                                    <p:anim calcmode="lin" valueType="num">
+                                      <p:cBhvr additive="base">
+                                        <p:cTn id="28" dur="500" fill="hold"/>
+                                        <p:tgtEl>
+                                          <p:spTgt spid="5"/>
+                                        </p:tgtEl>
+                                        <p:attrNameLst>
+                                          <p:attrName>ppt_y</p:attrName>
+                                        </p:attrNameLst>
+                                      </p:cBhvr>
+                                      <p:tavLst>
+                                        <p:tav tm="0">
+                                          <p:val>
+                                            <p:strVal val="1+#ppt_h/2"/>
+                                          </p:val>
+                                        </p:tav>
+                                        <p:tav tm="100000">
+                                          <p:val>
+                                            <p:strVal val="#ppt_y"/>
+                                          </p:val>
+                                        </p:tav>
+                                      </p:tavLst>
+                                    </p:anim>
+                                  </p:childTnLst>
+                                </p:cTn>
+                              </p:par>
+                            </p:childTnLst>
+                          </p:cTn>
+                        </p:par>
+                      </p:childTnLst>
+                    </p:cTn>
+                  </p:par>
+                  <p:par>
+                    <p:cTn id="29" fill="hold">
+                      <p:stCondLst>
+                        <p:cond delay="indefinite"/>
+                      </p:stCondLst>
+                      <p:childTnLst>
+                        <p:par>
+                          <p:cTn id="30" fill="hold">
+                            <p:stCondLst>
+                              <p:cond delay="0"/>
+                            </p:stCondLst>
+                            <p:childTnLst>
+                              <p:par>
+                                <p:cTn id="31" presetID="1" presetClass="entr" presetSubtype="0" fill="hold" nodeType="clickEffect">
+                                  <p:stCondLst>
+                                    <p:cond delay="0"/>
+                                  </p:stCondLst>
+                                  <p:childTnLst>
+                                    <p:set>
+                                      <p:cBhvr>
+                                        <p:cTn id="32" dur="1" fill="hold">
                                           <p:stCondLst>
                                             <p:cond delay="0"/>
                                           </p:stCondLst>
@@ -5532,26 +7575,26 @@
                     </p:cTn>
                   </p:par>
                   <p:par>
-                    <p:cTn id="27" fill="hold">
+                    <p:cTn id="33" fill="hold">
                       <p:stCondLst>
                         <p:cond delay="indefinite"/>
                       </p:stCondLst>
                       <p:childTnLst>
                         <p:par>
-                          <p:cTn id="28" fill="hold">
+                          <p:cTn id="34" fill="hold">
                             <p:stCondLst>
                               <p:cond delay="0"/>
                             </p:stCondLst>
                             <p:childTnLst>
                               <p:par>
-                                <p:cTn id="29" presetID="1" presetClass="entr" presetSubtype="0" fill="hold" nodeType="clickEffect">
+                                <p:cTn id="35" presetID="1" presetClass="entr" presetSubtype="0" fill="hold" nodeType="clickEffect">
                                   <p:stCondLst>
                                     <p:cond delay="0"/>
                                   </p:stCondLst>
                                   <p:childTnLst>
                                     <p:set>
                                       <p:cBhvr>
-                                        <p:cTn id="30" dur="1" fill="hold">
+                                        <p:cTn id="36" dur="1" fill="hold">
                                           <p:stCondLst>
                                             <p:cond delay="0"/>
                                           </p:stCondLst>
@@ -5560,6 +7603,55 @@
                                           <p:spTgt spid="3">
                                             <p:txEl>
                                               <p:pRg st="6" end="6"/>
+                                            </p:txEl>
+                                          </p:spTgt>
+                                        </p:tgtEl>
+                                        <p:attrNameLst>
+                                          <p:attrName>style.visibility</p:attrName>
+                                        </p:attrNameLst>
+                                      </p:cBhvr>
+                                      <p:to>
+                                        <p:strVal val="visible"/>
+                                      </p:to>
+                                    </p:set>
+                                  </p:childTnLst>
+                                </p:cTn>
+                              </p:par>
+                            </p:childTnLst>
+                          </p:cTn>
+                        </p:par>
+                      </p:childTnLst>
+                    </p:cTn>
+                  </p:par>
+                  <p:par>
+                    <p:cTn id="37" fill="hold">
+                      <p:stCondLst>
+                        <p:cond delay="indefinite"/>
+                      </p:stCondLst>
+                      <p:childTnLst>
+                        <p:par>
+                          <p:cTn id="38" fill="hold">
+                            <p:stCondLst>
+                              <p:cond delay="0"/>
+                            </p:stCondLst>
+                            <p:childTnLst>
+                              <p:par>
+                                <p:cTn id="39" presetID="1" presetClass="entr" presetSubtype="0" fill="hold" nodeType="clickEffect">
+                                  <p:stCondLst>
+                                    <p:cond delay="0"/>
+                                  </p:stCondLst>
+                                  <p:childTnLst>
+                                    <p:set>
+                                      <p:cBhvr>
+                                        <p:cTn id="40" dur="1" fill="hold">
+                                          <p:stCondLst>
+                                            <p:cond delay="0"/>
+                                          </p:stCondLst>
+                                        </p:cTn>
+                                        <p:tgtEl>
+                                          <p:spTgt spid="3">
+                                            <p:txEl>
+                                              <p:pRg st="7" end="7"/>
                                             </p:txEl>
                                           </p:spTgt>
                                         </p:tgtEl>
@@ -5679,7 +7771,7 @@
           <a:p>
             <a:r>
               <a:rPr lang="en-US" dirty="0"/>
-              <a:t>Those that exist use methods that aren’t direct (NAAL, 2003)</a:t>
+              <a:t>Those that exist use methods that aren’t direct (NAAL; , 2003)</a:t>
             </a:r>
           </a:p>
           <a:p>
@@ -6114,15 +8206,7 @@
           <a:p>
             <a:r>
               <a:rPr lang="en-US" dirty="0"/>
-              <a:t>Literacy </a:t>
-            </a:r>
-            <a:r>
-              <a:rPr lang="en-US" i="1" dirty="0"/>
-              <a:t>development</a:t>
-            </a:r>
-            <a:r>
-              <a:rPr lang="en-US" dirty="0"/>
-              <a:t> is, well…</a:t>
+              <a:t>Literacy development is…</a:t>
             </a:r>
             <a:r>
               <a:rPr lang="en-US" i="1" dirty="0"/>
@@ -6138,7 +8222,7 @@
           <a:p>
             <a:r>
               <a:rPr lang="en-US" dirty="0"/>
-              <a:t>Connection between youth literacy and adult outcomes (</a:t>
+              <a:t>Connection between youth literacy and downstream outcomes (</a:t>
             </a:r>
             <a:r>
               <a:rPr lang="en-US" dirty="0" err="1"/>
@@ -6146,7 +8230,7 @@
             </a:r>
             <a:r>
               <a:rPr lang="en-US" dirty="0"/>
-              <a:t> et al., 1993; NRP, 2000)</a:t>
+              <a:t> et al., 1993; NRP, 2000; Seidenberg, 2017)</a:t>
             </a:r>
           </a:p>
           <a:p>
@@ -6164,7 +8248,7 @@
           <a:p>
             <a:r>
               <a:rPr lang="en-US" dirty="0"/>
-              <a:t>Though more is publicly available (more on that later)</a:t>
+              <a:t>Existing publicly available resources (more on that later)</a:t>
             </a:r>
           </a:p>
           <a:p>
@@ -6557,27 +8641,85 @@
           </a:p>
         </p:txBody>
       </p:sp>
-      <p:sp>
-        <p:nvSpPr>
-          <p:cNvPr id="3" name="Content Placeholder 2">
-            <a:extLst>
-              <a:ext uri="{FF2B5EF4-FFF2-40B4-BE49-F238E27FC236}">
-                <a16:creationId xmlns:a16="http://schemas.microsoft.com/office/drawing/2014/main" id="{538088E9-83D8-094D-B6D3-139A0EF4C29B}"/>
-              </a:ext>
-            </a:extLst>
-          </p:cNvPr>
-          <p:cNvSpPr>
-            <a:spLocks noGrp="1"/>
-          </p:cNvSpPr>
-          <p:nvPr>
-            <p:ph idx="1"/>
-          </p:nvPr>
-        </p:nvSpPr>
-        <p:spPr/>
-        <p:txBody>
-          <a:bodyPr/>
+      <p:pic>
+        <p:nvPicPr>
+          <p:cNvPr id="5" name="Picture 4" descr="A screenshot of a social media post&#10;&#10;Description automatically generated">
+            <a:extLst>
+              <a:ext uri="{FF2B5EF4-FFF2-40B4-BE49-F238E27FC236}">
+                <a16:creationId xmlns:a16="http://schemas.microsoft.com/office/drawing/2014/main" id="{E6A1742D-4F7F-3841-B2E4-6F7F13000F03}"/>
+              </a:ext>
+            </a:extLst>
+          </p:cNvPr>
+          <p:cNvPicPr>
+            <a:picLocks noChangeAspect="1"/>
+          </p:cNvPicPr>
+          <p:nvPr/>
+        </p:nvPicPr>
+        <p:blipFill>
+          <a:blip r:embed="rId3"/>
+          <a:stretch>
+            <a:fillRect/>
+          </a:stretch>
+        </p:blipFill>
+        <p:spPr>
+          <a:xfrm>
+            <a:off x="2278472" y="1428460"/>
+            <a:ext cx="7635055" cy="5102098"/>
+          </a:xfrm>
+          <a:prstGeom prst="rect">
+            <a:avLst/>
+          </a:prstGeom>
+        </p:spPr>
+      </p:pic>
+      <p:sp>
+        <p:nvSpPr>
+          <p:cNvPr id="6" name="Oval 5">
+            <a:extLst>
+              <a:ext uri="{FF2B5EF4-FFF2-40B4-BE49-F238E27FC236}">
+                <a16:creationId xmlns:a16="http://schemas.microsoft.com/office/drawing/2014/main" id="{10FB99C6-0137-2642-972C-67DA07950B40}"/>
+              </a:ext>
+            </a:extLst>
+          </p:cNvPr>
+          <p:cNvSpPr/>
+          <p:nvPr/>
+        </p:nvSpPr>
+        <p:spPr>
+          <a:xfrm>
+            <a:off x="7297614" y="5642569"/>
+            <a:ext cx="1992087" cy="557893"/>
+          </a:xfrm>
+          <a:prstGeom prst="ellipse">
+            <a:avLst/>
+          </a:prstGeom>
+          <a:noFill/>
+          <a:ln w="41275">
+            <a:solidFill>
+              <a:srgbClr val="FFFF00"/>
+            </a:solidFill>
+            <a:prstDash val="sysDash"/>
+          </a:ln>
+        </p:spPr>
+        <p:style>
+          <a:lnRef idx="2">
+            <a:schemeClr val="accent1">
+              <a:shade val="50000"/>
+            </a:schemeClr>
+          </a:lnRef>
+          <a:fillRef idx="1">
+            <a:schemeClr val="accent1"/>
+          </a:fillRef>
+          <a:effectRef idx="0">
+            <a:schemeClr val="accent1"/>
+          </a:effectRef>
+          <a:fontRef idx="minor">
+            <a:schemeClr val="lt1"/>
+          </a:fontRef>
+        </p:style>
+        <p:txBody>
+          <a:bodyPr rtlCol="0" anchor="ctr"/>
           <a:lstStyle/>
           <a:p>
+            <a:pPr algn="ctr"/>
             <a:endParaRPr lang="en-US" dirty="0"/>
           </a:p>
         </p:txBody>
@@ -6592,6 +8734,130 @@
   <p:clrMapOvr>
     <a:masterClrMapping/>
   </p:clrMapOvr>
+  <p:timing>
+    <p:tnLst>
+      <p:par>
+        <p:cTn id="1" dur="indefinite" restart="never" nodeType="tmRoot">
+          <p:childTnLst>
+            <p:seq concurrent="1" nextAc="seek">
+              <p:cTn id="2" dur="indefinite" nodeType="mainSeq">
+                <p:childTnLst>
+                  <p:par>
+                    <p:cTn id="3" fill="hold">
+                      <p:stCondLst>
+                        <p:cond delay="indefinite"/>
+                      </p:stCondLst>
+                      <p:childTnLst>
+                        <p:par>
+                          <p:cTn id="4" fill="hold">
+                            <p:stCondLst>
+                              <p:cond delay="0"/>
+                            </p:stCondLst>
+                            <p:childTnLst>
+                              <p:par>
+                                <p:cTn id="5" presetID="2" presetClass="entr" presetSubtype="4" fill="hold" grpId="0" nodeType="clickEffect">
+                                  <p:stCondLst>
+                                    <p:cond delay="0"/>
+                                  </p:stCondLst>
+                                  <p:childTnLst>
+                                    <p:set>
+                                      <p:cBhvr>
+                                        <p:cTn id="6" dur="1" fill="hold">
+                                          <p:stCondLst>
+                                            <p:cond delay="0"/>
+                                          </p:stCondLst>
+                                        </p:cTn>
+                                        <p:tgtEl>
+                                          <p:spTgt spid="6"/>
+                                        </p:tgtEl>
+                                        <p:attrNameLst>
+                                          <p:attrName>style.visibility</p:attrName>
+                                        </p:attrNameLst>
+                                      </p:cBhvr>
+                                      <p:to>
+                                        <p:strVal val="visible"/>
+                                      </p:to>
+                                    </p:set>
+                                    <p:anim calcmode="lin" valueType="num">
+                                      <p:cBhvr additive="base">
+                                        <p:cTn id="7" dur="500" fill="hold"/>
+                                        <p:tgtEl>
+                                          <p:spTgt spid="6"/>
+                                        </p:tgtEl>
+                                        <p:attrNameLst>
+                                          <p:attrName>ppt_x</p:attrName>
+                                        </p:attrNameLst>
+                                      </p:cBhvr>
+                                      <p:tavLst>
+                                        <p:tav tm="0">
+                                          <p:val>
+                                            <p:strVal val="#ppt_x"/>
+                                          </p:val>
+                                        </p:tav>
+                                        <p:tav tm="100000">
+                                          <p:val>
+                                            <p:strVal val="#ppt_x"/>
+                                          </p:val>
+                                        </p:tav>
+                                      </p:tavLst>
+                                    </p:anim>
+                                    <p:anim calcmode="lin" valueType="num">
+                                      <p:cBhvr additive="base">
+                                        <p:cTn id="8" dur="500" fill="hold"/>
+                                        <p:tgtEl>
+                                          <p:spTgt spid="6"/>
+                                        </p:tgtEl>
+                                        <p:attrNameLst>
+                                          <p:attrName>ppt_y</p:attrName>
+                                        </p:attrNameLst>
+                                      </p:cBhvr>
+                                      <p:tavLst>
+                                        <p:tav tm="0">
+                                          <p:val>
+                                            <p:strVal val="1+#ppt_h/2"/>
+                                          </p:val>
+                                        </p:tav>
+                                        <p:tav tm="100000">
+                                          <p:val>
+                                            <p:strVal val="#ppt_y"/>
+                                          </p:val>
+                                        </p:tav>
+                                      </p:tavLst>
+                                    </p:anim>
+                                  </p:childTnLst>
+                                </p:cTn>
+                              </p:par>
+                            </p:childTnLst>
+                          </p:cTn>
+                        </p:par>
+                      </p:childTnLst>
+                    </p:cTn>
+                  </p:par>
+                </p:childTnLst>
+              </p:cTn>
+              <p:prevCondLst>
+                <p:cond evt="onPrev" delay="0">
+                  <p:tgtEl>
+                    <p:sldTgt/>
+                  </p:tgtEl>
+                </p:cond>
+              </p:prevCondLst>
+              <p:nextCondLst>
+                <p:cond evt="onNext" delay="0">
+                  <p:tgtEl>
+                    <p:sldTgt/>
+                  </p:tgtEl>
+                </p:cond>
+              </p:nextCondLst>
+            </p:seq>
+          </p:childTnLst>
+        </p:cTn>
+      </p:par>
+    </p:tnLst>
+    <p:bldLst>
+      <p:bldP spid="6" grpId="0" animBg="1"/>
+    </p:bldLst>
+  </p:timing>
 </p:sld>
 </file>
 
@@ -6612,6 +8878,303 @@
           <a:chExt cx="0" cy="0"/>
         </a:xfrm>
       </p:grpSpPr>
+      <p:pic>
+        <p:nvPicPr>
+          <p:cNvPr id="5" name="Picture 4" descr="A screenshot of a social media post&#10;&#10;Description automatically generated">
+            <a:extLst>
+              <a:ext uri="{FF2B5EF4-FFF2-40B4-BE49-F238E27FC236}">
+                <a16:creationId xmlns:a16="http://schemas.microsoft.com/office/drawing/2014/main" id="{BACF4942-8A0E-5543-A8EF-440BDAE5EA17}"/>
+              </a:ext>
+            </a:extLst>
+          </p:cNvPr>
+          <p:cNvPicPr>
+            <a:picLocks noChangeAspect="1"/>
+          </p:cNvPicPr>
+          <p:nvPr/>
+        </p:nvPicPr>
+        <p:blipFill>
+          <a:blip r:embed="rId2"/>
+          <a:stretch>
+            <a:fillRect/>
+          </a:stretch>
+        </p:blipFill>
+        <p:spPr>
+          <a:xfrm>
+            <a:off x="187925" y="0"/>
+            <a:ext cx="11816149" cy="6858000"/>
+          </a:xfrm>
+          <a:prstGeom prst="rect">
+            <a:avLst/>
+          </a:prstGeom>
+        </p:spPr>
+      </p:pic>
+      <p:sp>
+        <p:nvSpPr>
+          <p:cNvPr id="6" name="Oval 5">
+            <a:extLst>
+              <a:ext uri="{FF2B5EF4-FFF2-40B4-BE49-F238E27FC236}">
+                <a16:creationId xmlns:a16="http://schemas.microsoft.com/office/drawing/2014/main" id="{0AE597F3-A393-2E44-B924-2C7D18D3EA95}"/>
+              </a:ext>
+            </a:extLst>
+          </p:cNvPr>
+          <p:cNvSpPr/>
+          <p:nvPr/>
+        </p:nvSpPr>
+        <p:spPr>
+          <a:xfrm>
+            <a:off x="531054" y="4499569"/>
+            <a:ext cx="5069646" cy="483911"/>
+          </a:xfrm>
+          <a:prstGeom prst="ellipse">
+            <a:avLst/>
+          </a:prstGeom>
+          <a:noFill/>
+          <a:ln w="41275">
+            <a:solidFill>
+              <a:srgbClr val="C00000"/>
+            </a:solidFill>
+            <a:prstDash val="sysDash"/>
+          </a:ln>
+        </p:spPr>
+        <p:style>
+          <a:lnRef idx="2">
+            <a:schemeClr val="accent1">
+              <a:shade val="50000"/>
+            </a:schemeClr>
+          </a:lnRef>
+          <a:fillRef idx="1">
+            <a:schemeClr val="accent1"/>
+          </a:fillRef>
+          <a:effectRef idx="0">
+            <a:schemeClr val="accent1"/>
+          </a:effectRef>
+          <a:fontRef idx="minor">
+            <a:schemeClr val="lt1"/>
+          </a:fontRef>
+        </p:style>
+        <p:txBody>
+          <a:bodyPr rtlCol="0" anchor="ctr"/>
+          <a:lstStyle/>
+          <a:p>
+            <a:pPr algn="ctr"/>
+            <a:endParaRPr lang="en-US" dirty="0"/>
+          </a:p>
+        </p:txBody>
+      </p:sp>
+    </p:spTree>
+    <p:extLst>
+      <p:ext uri="{BB962C8B-B14F-4D97-AF65-F5344CB8AC3E}">
+        <p14:creationId xmlns:p14="http://schemas.microsoft.com/office/powerpoint/2010/main" val="2629340034"/>
+      </p:ext>
+    </p:extLst>
+  </p:cSld>
+  <p:clrMapOvr>
+    <a:masterClrMapping/>
+  </p:clrMapOvr>
+  <p:timing>
+    <p:tnLst>
+      <p:par>
+        <p:cTn id="1" dur="indefinite" restart="never" nodeType="tmRoot">
+          <p:childTnLst>
+            <p:seq concurrent="1" nextAc="seek">
+              <p:cTn id="2" dur="indefinite" nodeType="mainSeq">
+                <p:childTnLst>
+                  <p:par>
+                    <p:cTn id="3" fill="hold">
+                      <p:stCondLst>
+                        <p:cond delay="indefinite"/>
+                      </p:stCondLst>
+                      <p:childTnLst>
+                        <p:par>
+                          <p:cTn id="4" fill="hold">
+                            <p:stCondLst>
+                              <p:cond delay="0"/>
+                            </p:stCondLst>
+                            <p:childTnLst>
+                              <p:par>
+                                <p:cTn id="5" presetID="2" presetClass="entr" presetSubtype="4" fill="hold" grpId="0" nodeType="clickEffect">
+                                  <p:stCondLst>
+                                    <p:cond delay="0"/>
+                                  </p:stCondLst>
+                                  <p:childTnLst>
+                                    <p:set>
+                                      <p:cBhvr>
+                                        <p:cTn id="6" dur="1" fill="hold">
+                                          <p:stCondLst>
+                                            <p:cond delay="0"/>
+                                          </p:stCondLst>
+                                        </p:cTn>
+                                        <p:tgtEl>
+                                          <p:spTgt spid="6"/>
+                                        </p:tgtEl>
+                                        <p:attrNameLst>
+                                          <p:attrName>style.visibility</p:attrName>
+                                        </p:attrNameLst>
+                                      </p:cBhvr>
+                                      <p:to>
+                                        <p:strVal val="visible"/>
+                                      </p:to>
+                                    </p:set>
+                                    <p:anim calcmode="lin" valueType="num">
+                                      <p:cBhvr additive="base">
+                                        <p:cTn id="7" dur="500" fill="hold"/>
+                                        <p:tgtEl>
+                                          <p:spTgt spid="6"/>
+                                        </p:tgtEl>
+                                        <p:attrNameLst>
+                                          <p:attrName>ppt_x</p:attrName>
+                                        </p:attrNameLst>
+                                      </p:cBhvr>
+                                      <p:tavLst>
+                                        <p:tav tm="0">
+                                          <p:val>
+                                            <p:strVal val="#ppt_x"/>
+                                          </p:val>
+                                        </p:tav>
+                                        <p:tav tm="100000">
+                                          <p:val>
+                                            <p:strVal val="#ppt_x"/>
+                                          </p:val>
+                                        </p:tav>
+                                      </p:tavLst>
+                                    </p:anim>
+                                    <p:anim calcmode="lin" valueType="num">
+                                      <p:cBhvr additive="base">
+                                        <p:cTn id="8" dur="500" fill="hold"/>
+                                        <p:tgtEl>
+                                          <p:spTgt spid="6"/>
+                                        </p:tgtEl>
+                                        <p:attrNameLst>
+                                          <p:attrName>ppt_y</p:attrName>
+                                        </p:attrNameLst>
+                                      </p:cBhvr>
+                                      <p:tavLst>
+                                        <p:tav tm="0">
+                                          <p:val>
+                                            <p:strVal val="1+#ppt_h/2"/>
+                                          </p:val>
+                                        </p:tav>
+                                        <p:tav tm="100000">
+                                          <p:val>
+                                            <p:strVal val="#ppt_y"/>
+                                          </p:val>
+                                        </p:tav>
+                                      </p:tavLst>
+                                    </p:anim>
+                                  </p:childTnLst>
+                                </p:cTn>
+                              </p:par>
+                            </p:childTnLst>
+                          </p:cTn>
+                        </p:par>
+                      </p:childTnLst>
+                    </p:cTn>
+                  </p:par>
+                </p:childTnLst>
+              </p:cTn>
+              <p:prevCondLst>
+                <p:cond evt="onPrev" delay="0">
+                  <p:tgtEl>
+                    <p:sldTgt/>
+                  </p:tgtEl>
+                </p:cond>
+              </p:prevCondLst>
+              <p:nextCondLst>
+                <p:cond evt="onNext" delay="0">
+                  <p:tgtEl>
+                    <p:sldTgt/>
+                  </p:tgtEl>
+                </p:cond>
+              </p:nextCondLst>
+            </p:seq>
+          </p:childTnLst>
+        </p:cTn>
+      </p:par>
+    </p:tnLst>
+    <p:bldLst>
+      <p:bldP spid="6" grpId="0" animBg="1"/>
+    </p:bldLst>
+  </p:timing>
+</p:sld>
+</file>
+
+<file path=ppt/slides/slide8.xml><?xml version="1.0" encoding="utf-8"?>
+<p:sld xmlns:a="http://schemas.openxmlformats.org/drawingml/2006/main" xmlns:r="http://schemas.openxmlformats.org/officeDocument/2006/relationships" xmlns:p="http://schemas.openxmlformats.org/presentationml/2006/main">
+  <p:cSld>
+    <p:spTree>
+      <p:nvGrpSpPr>
+        <p:cNvPr id="1" name=""/>
+        <p:cNvGrpSpPr/>
+        <p:nvPr/>
+      </p:nvGrpSpPr>
+      <p:grpSpPr>
+        <a:xfrm>
+          <a:off x="0" y="0"/>
+          <a:ext cx="0" cy="0"/>
+          <a:chOff x="0" y="0"/>
+          <a:chExt cx="0" cy="0"/>
+        </a:xfrm>
+      </p:grpSpPr>
+      <p:pic>
+        <p:nvPicPr>
+          <p:cNvPr id="4" name="Picture 3" descr="A screenshot of a social media post&#10;&#10;Description automatically generated">
+            <a:extLst>
+              <a:ext uri="{FF2B5EF4-FFF2-40B4-BE49-F238E27FC236}">
+                <a16:creationId xmlns:a16="http://schemas.microsoft.com/office/drawing/2014/main" id="{A8870D67-2027-3E4C-975C-E292974EEC31}"/>
+              </a:ext>
+            </a:extLst>
+          </p:cNvPr>
+          <p:cNvPicPr>
+            <a:picLocks noChangeAspect="1"/>
+          </p:cNvPicPr>
+          <p:nvPr/>
+        </p:nvPicPr>
+        <p:blipFill>
+          <a:blip r:embed="rId2"/>
+          <a:stretch>
+            <a:fillRect/>
+          </a:stretch>
+        </p:blipFill>
+        <p:spPr>
+          <a:xfrm>
+            <a:off x="1358900" y="534020"/>
+            <a:ext cx="9474200" cy="6146800"/>
+          </a:xfrm>
+          <a:prstGeom prst="rect">
+            <a:avLst/>
+          </a:prstGeom>
+        </p:spPr>
+      </p:pic>
+    </p:spTree>
+    <p:extLst>
+      <p:ext uri="{BB962C8B-B14F-4D97-AF65-F5344CB8AC3E}">
+        <p14:creationId xmlns:p14="http://schemas.microsoft.com/office/powerpoint/2010/main" val="4175244268"/>
+      </p:ext>
+    </p:extLst>
+  </p:cSld>
+  <p:clrMapOvr>
+    <a:masterClrMapping/>
+  </p:clrMapOvr>
+</p:sld>
+</file>
+
+<file path=ppt/slides/slide9.xml><?xml version="1.0" encoding="utf-8"?>
+<p:sld xmlns:a="http://schemas.openxmlformats.org/drawingml/2006/main" xmlns:r="http://schemas.openxmlformats.org/officeDocument/2006/relationships" xmlns:p="http://schemas.openxmlformats.org/presentationml/2006/main">
+  <p:cSld>
+    <p:spTree>
+      <p:nvGrpSpPr>
+        <p:cNvPr id="1" name=""/>
+        <p:cNvGrpSpPr/>
+        <p:nvPr/>
+      </p:nvGrpSpPr>
+      <p:grpSpPr>
+        <a:xfrm>
+          <a:off x="0" y="0"/>
+          <a:ext cx="0" cy="0"/>
+          <a:chOff x="0" y="0"/>
+          <a:chExt cx="0" cy="0"/>
+        </a:xfrm>
+      </p:grpSpPr>
       <p:sp>
         <p:nvSpPr>
           <p:cNvPr id="2" name="Title 1">
@@ -6635,7 +9198,7 @@
           <a:p>
             <a:r>
               <a:rPr lang="en-US" dirty="0"/>
-              <a:t>A few basics</a:t>
+              <a:t>A few basics of the interactive tool</a:t>
             </a:r>
           </a:p>
         </p:txBody>
@@ -7054,664 +9617,6 @@
         </p:cTn>
       </p:par>
     </p:tnLst>
-  </p:timing>
-</p:sld>
-</file>
-
-<file path=ppt/slides/slide8.xml><?xml version="1.0" encoding="utf-8"?>
-<p:sld xmlns:a="http://schemas.openxmlformats.org/drawingml/2006/main" xmlns:r="http://schemas.openxmlformats.org/officeDocument/2006/relationships" xmlns:p="http://schemas.openxmlformats.org/presentationml/2006/main">
-  <p:cSld>
-    <p:spTree>
-      <p:nvGrpSpPr>
-        <p:cNvPr id="1" name=""/>
-        <p:cNvGrpSpPr/>
-        <p:nvPr/>
-      </p:nvGrpSpPr>
-      <p:grpSpPr>
-        <a:xfrm>
-          <a:off x="0" y="0"/>
-          <a:ext cx="0" cy="0"/>
-          <a:chOff x="0" y="0"/>
-          <a:chExt cx="0" cy="0"/>
-        </a:xfrm>
-      </p:grpSpPr>
-      <p:pic>
-        <p:nvPicPr>
-          <p:cNvPr id="5" name="Picture 4" descr="A screenshot of a social media post&#10;&#10;Description automatically generated">
-            <a:extLst>
-              <a:ext uri="{FF2B5EF4-FFF2-40B4-BE49-F238E27FC236}">
-                <a16:creationId xmlns:a16="http://schemas.microsoft.com/office/drawing/2014/main" id="{BB0D1C69-96E5-F049-9A48-901AFB2A562F}"/>
-              </a:ext>
-            </a:extLst>
-          </p:cNvPr>
-          <p:cNvPicPr>
-            <a:picLocks noChangeAspect="1"/>
-          </p:cNvPicPr>
-          <p:nvPr/>
-        </p:nvPicPr>
-        <p:blipFill>
-          <a:blip r:embed="rId2"/>
-          <a:stretch>
-            <a:fillRect/>
-          </a:stretch>
-        </p:blipFill>
-        <p:spPr>
-          <a:xfrm>
-            <a:off x="1358900" y="534020"/>
-            <a:ext cx="9474200" cy="6146800"/>
-          </a:xfrm>
-          <a:prstGeom prst="rect">
-            <a:avLst/>
-          </a:prstGeom>
-        </p:spPr>
-      </p:pic>
-      <p:sp>
-        <p:nvSpPr>
-          <p:cNvPr id="6" name="Oval 5">
-            <a:extLst>
-              <a:ext uri="{FF2B5EF4-FFF2-40B4-BE49-F238E27FC236}">
-                <a16:creationId xmlns:a16="http://schemas.microsoft.com/office/drawing/2014/main" id="{656005CF-6876-C140-8005-06698AE6BD67}"/>
-              </a:ext>
-            </a:extLst>
-          </p:cNvPr>
-          <p:cNvSpPr/>
-          <p:nvPr/>
-        </p:nvSpPr>
-        <p:spPr>
-          <a:xfrm>
-            <a:off x="1738043" y="2096432"/>
-            <a:ext cx="3436124" cy="1287964"/>
-          </a:xfrm>
-          <a:prstGeom prst="ellipse">
-            <a:avLst/>
-          </a:prstGeom>
-          <a:noFill/>
-          <a:ln w="41275">
-            <a:solidFill>
-              <a:srgbClr val="C00000"/>
-            </a:solidFill>
-            <a:prstDash val="sysDot"/>
-          </a:ln>
-        </p:spPr>
-        <p:style>
-          <a:lnRef idx="2">
-            <a:schemeClr val="accent1">
-              <a:shade val="50000"/>
-            </a:schemeClr>
-          </a:lnRef>
-          <a:fillRef idx="1">
-            <a:schemeClr val="accent1"/>
-          </a:fillRef>
-          <a:effectRef idx="0">
-            <a:schemeClr val="accent1"/>
-          </a:effectRef>
-          <a:fontRef idx="minor">
-            <a:schemeClr val="lt1"/>
-          </a:fontRef>
-        </p:style>
-        <p:txBody>
-          <a:bodyPr rtlCol="0" anchor="ctr"/>
-          <a:lstStyle/>
-          <a:p>
-            <a:pPr algn="ctr"/>
-            <a:endParaRPr lang="en-US" dirty="0"/>
-          </a:p>
-        </p:txBody>
-      </p:sp>
-      <p:sp>
-        <p:nvSpPr>
-          <p:cNvPr id="7" name="TextBox 6">
-            <a:extLst>
-              <a:ext uri="{FF2B5EF4-FFF2-40B4-BE49-F238E27FC236}">
-                <a16:creationId xmlns:a16="http://schemas.microsoft.com/office/drawing/2014/main" id="{65E7E879-7387-8641-96BE-7A196924F4D7}"/>
-              </a:ext>
-            </a:extLst>
-          </p:cNvPr>
-          <p:cNvSpPr txBox="1"/>
-          <p:nvPr/>
-        </p:nvSpPr>
-        <p:spPr>
-          <a:xfrm>
-            <a:off x="200722" y="2096432"/>
-            <a:ext cx="1036822" cy="461665"/>
-          </a:xfrm>
-          <a:prstGeom prst="rect">
-            <a:avLst/>
-          </a:prstGeom>
-          <a:noFill/>
-        </p:spPr>
-        <p:txBody>
-          <a:bodyPr wrap="none" rtlCol="0">
-            <a:spAutoFit/>
-          </a:bodyPr>
-          <a:lstStyle/>
-          <a:p>
-            <a:r>
-              <a:rPr lang="en-US" sz="2400" dirty="0">
-                <a:solidFill>
-                  <a:srgbClr val="C00000"/>
-                </a:solidFill>
-              </a:rPr>
-              <a:t>county</a:t>
-            </a:r>
-          </a:p>
-        </p:txBody>
-      </p:sp>
-      <p:cxnSp>
-        <p:nvCxnSpPr>
-          <p:cNvPr id="9" name="Straight Arrow Connector 8">
-            <a:extLst>
-              <a:ext uri="{FF2B5EF4-FFF2-40B4-BE49-F238E27FC236}">
-                <a16:creationId xmlns:a16="http://schemas.microsoft.com/office/drawing/2014/main" id="{428C0CFF-48A7-E348-A427-C0F80393BA6E}"/>
-              </a:ext>
-            </a:extLst>
-          </p:cNvPr>
-          <p:cNvCxnSpPr>
-            <a:stCxn id="7" idx="2"/>
-          </p:cNvCxnSpPr>
-          <p:nvPr/>
-        </p:nvCxnSpPr>
-        <p:spPr>
-          <a:xfrm>
-            <a:off x="719133" y="2558097"/>
-            <a:ext cx="819735" cy="162801"/>
-          </a:xfrm>
-          <a:prstGeom prst="straightConnector1">
-            <a:avLst/>
-          </a:prstGeom>
-          <a:ln w="25400">
-            <a:solidFill>
-              <a:srgbClr val="C00000"/>
-            </a:solidFill>
-            <a:tailEnd type="triangle"/>
-          </a:ln>
-        </p:spPr>
-        <p:style>
-          <a:lnRef idx="1">
-            <a:schemeClr val="accent1"/>
-          </a:lnRef>
-          <a:fillRef idx="0">
-            <a:schemeClr val="accent1"/>
-          </a:fillRef>
-          <a:effectRef idx="0">
-            <a:schemeClr val="accent1"/>
-          </a:effectRef>
-          <a:fontRef idx="minor">
-            <a:schemeClr val="tx1"/>
-          </a:fontRef>
-        </p:style>
-      </p:cxnSp>
-    </p:spTree>
-    <p:extLst>
-      <p:ext uri="{BB962C8B-B14F-4D97-AF65-F5344CB8AC3E}">
-        <p14:creationId xmlns:p14="http://schemas.microsoft.com/office/powerpoint/2010/main" val="3842645150"/>
-      </p:ext>
-    </p:extLst>
-  </p:cSld>
-  <p:clrMapOvr>
-    <a:masterClrMapping/>
-  </p:clrMapOvr>
-  <p:timing>
-    <p:tnLst>
-      <p:par>
-        <p:cTn id="1" dur="indefinite" restart="never" nodeType="tmRoot">
-          <p:childTnLst>
-            <p:seq concurrent="1" nextAc="seek">
-              <p:cTn id="2" dur="indefinite" nodeType="mainSeq">
-                <p:childTnLst>
-                  <p:par>
-                    <p:cTn id="3" fill="hold">
-                      <p:stCondLst>
-                        <p:cond delay="indefinite"/>
-                      </p:stCondLst>
-                      <p:childTnLst>
-                        <p:par>
-                          <p:cTn id="4" fill="hold">
-                            <p:stCondLst>
-                              <p:cond delay="0"/>
-                            </p:stCondLst>
-                            <p:childTnLst>
-                              <p:par>
-                                <p:cTn id="5" presetID="1" presetClass="entr" presetSubtype="0" fill="hold" grpId="0" nodeType="clickEffect">
-                                  <p:stCondLst>
-                                    <p:cond delay="0"/>
-                                  </p:stCondLst>
-                                  <p:childTnLst>
-                                    <p:set>
-                                      <p:cBhvr>
-                                        <p:cTn id="6" dur="1" fill="hold">
-                                          <p:stCondLst>
-                                            <p:cond delay="0"/>
-                                          </p:stCondLst>
-                                        </p:cTn>
-                                        <p:tgtEl>
-                                          <p:spTgt spid="6"/>
-                                        </p:tgtEl>
-                                        <p:attrNameLst>
-                                          <p:attrName>style.visibility</p:attrName>
-                                        </p:attrNameLst>
-                                      </p:cBhvr>
-                                      <p:to>
-                                        <p:strVal val="visible"/>
-                                      </p:to>
-                                    </p:set>
-                                  </p:childTnLst>
-                                </p:cTn>
-                              </p:par>
-                              <p:par>
-                                <p:cTn id="7" presetID="1" presetClass="entr" presetSubtype="0" fill="hold" nodeType="withEffect">
-                                  <p:stCondLst>
-                                    <p:cond delay="0"/>
-                                  </p:stCondLst>
-                                  <p:childTnLst>
-                                    <p:set>
-                                      <p:cBhvr>
-                                        <p:cTn id="8" dur="1" fill="hold">
-                                          <p:stCondLst>
-                                            <p:cond delay="0"/>
-                                          </p:stCondLst>
-                                        </p:cTn>
-                                        <p:tgtEl>
-                                          <p:spTgt spid="9"/>
-                                        </p:tgtEl>
-                                        <p:attrNameLst>
-                                          <p:attrName>style.visibility</p:attrName>
-                                        </p:attrNameLst>
-                                      </p:cBhvr>
-                                      <p:to>
-                                        <p:strVal val="visible"/>
-                                      </p:to>
-                                    </p:set>
-                                  </p:childTnLst>
-                                </p:cTn>
-                              </p:par>
-                              <p:par>
-                                <p:cTn id="9" presetID="1" presetClass="entr" presetSubtype="0" fill="hold" grpId="0" nodeType="withEffect">
-                                  <p:stCondLst>
-                                    <p:cond delay="0"/>
-                                  </p:stCondLst>
-                                  <p:childTnLst>
-                                    <p:set>
-                                      <p:cBhvr>
-                                        <p:cTn id="10" dur="1" fill="hold">
-                                          <p:stCondLst>
-                                            <p:cond delay="0"/>
-                                          </p:stCondLst>
-                                        </p:cTn>
-                                        <p:tgtEl>
-                                          <p:spTgt spid="7"/>
-                                        </p:tgtEl>
-                                        <p:attrNameLst>
-                                          <p:attrName>style.visibility</p:attrName>
-                                        </p:attrNameLst>
-                                      </p:cBhvr>
-                                      <p:to>
-                                        <p:strVal val="visible"/>
-                                      </p:to>
-                                    </p:set>
-                                  </p:childTnLst>
-                                </p:cTn>
-                              </p:par>
-                            </p:childTnLst>
-                          </p:cTn>
-                        </p:par>
-                      </p:childTnLst>
-                    </p:cTn>
-                  </p:par>
-                </p:childTnLst>
-              </p:cTn>
-              <p:prevCondLst>
-                <p:cond evt="onPrev" delay="0">
-                  <p:tgtEl>
-                    <p:sldTgt/>
-                  </p:tgtEl>
-                </p:cond>
-              </p:prevCondLst>
-              <p:nextCondLst>
-                <p:cond evt="onNext" delay="0">
-                  <p:tgtEl>
-                    <p:sldTgt/>
-                  </p:tgtEl>
-                </p:cond>
-              </p:nextCondLst>
-            </p:seq>
-          </p:childTnLst>
-        </p:cTn>
-      </p:par>
-    </p:tnLst>
-    <p:bldLst>
-      <p:bldP spid="6" grpId="0" animBg="1"/>
-      <p:bldP spid="7" grpId="0"/>
-    </p:bldLst>
-  </p:timing>
-</p:sld>
-</file>
-
-<file path=ppt/slides/slide9.xml><?xml version="1.0" encoding="utf-8"?>
-<p:sld xmlns:a="http://schemas.openxmlformats.org/drawingml/2006/main" xmlns:r="http://schemas.openxmlformats.org/officeDocument/2006/relationships" xmlns:p="http://schemas.openxmlformats.org/presentationml/2006/main">
-  <p:cSld>
-    <p:spTree>
-      <p:nvGrpSpPr>
-        <p:cNvPr id="1" name=""/>
-        <p:cNvGrpSpPr/>
-        <p:nvPr/>
-      </p:nvGrpSpPr>
-      <p:grpSpPr>
-        <a:xfrm>
-          <a:off x="0" y="0"/>
-          <a:ext cx="0" cy="0"/>
-          <a:chOff x="0" y="0"/>
-          <a:chExt cx="0" cy="0"/>
-        </a:xfrm>
-      </p:grpSpPr>
-      <p:pic>
-        <p:nvPicPr>
-          <p:cNvPr id="5" name="Picture 4" descr="A screenshot of a social media post&#10;&#10;Description automatically generated">
-            <a:extLst>
-              <a:ext uri="{FF2B5EF4-FFF2-40B4-BE49-F238E27FC236}">
-                <a16:creationId xmlns:a16="http://schemas.microsoft.com/office/drawing/2014/main" id="{BB0D1C69-96E5-F049-9A48-901AFB2A562F}"/>
-              </a:ext>
-            </a:extLst>
-          </p:cNvPr>
-          <p:cNvPicPr>
-            <a:picLocks noChangeAspect="1"/>
-          </p:cNvPicPr>
-          <p:nvPr/>
-        </p:nvPicPr>
-        <p:blipFill>
-          <a:blip r:embed="rId2"/>
-          <a:stretch>
-            <a:fillRect/>
-          </a:stretch>
-        </p:blipFill>
-        <p:spPr>
-          <a:xfrm>
-            <a:off x="1358900" y="534020"/>
-            <a:ext cx="9474200" cy="6146800"/>
-          </a:xfrm>
-          <a:prstGeom prst="rect">
-            <a:avLst/>
-          </a:prstGeom>
-        </p:spPr>
-      </p:pic>
-      <p:sp>
-        <p:nvSpPr>
-          <p:cNvPr id="6" name="Oval 5">
-            <a:extLst>
-              <a:ext uri="{FF2B5EF4-FFF2-40B4-BE49-F238E27FC236}">
-                <a16:creationId xmlns:a16="http://schemas.microsoft.com/office/drawing/2014/main" id="{656005CF-6876-C140-8005-06698AE6BD67}"/>
-              </a:ext>
-            </a:extLst>
-          </p:cNvPr>
-          <p:cNvSpPr/>
-          <p:nvPr/>
-        </p:nvSpPr>
-        <p:spPr>
-          <a:xfrm>
-            <a:off x="1581929" y="3077741"/>
-            <a:ext cx="3703752" cy="1561168"/>
-          </a:xfrm>
-          <a:prstGeom prst="ellipse">
-            <a:avLst/>
-          </a:prstGeom>
-          <a:noFill/>
-          <a:ln w="41275">
-            <a:solidFill>
-              <a:srgbClr val="C00000"/>
-            </a:solidFill>
-            <a:prstDash val="sysDot"/>
-          </a:ln>
-        </p:spPr>
-        <p:style>
-          <a:lnRef idx="2">
-            <a:schemeClr val="accent1">
-              <a:shade val="50000"/>
-            </a:schemeClr>
-          </a:lnRef>
-          <a:fillRef idx="1">
-            <a:schemeClr val="accent1"/>
-          </a:fillRef>
-          <a:effectRef idx="0">
-            <a:schemeClr val="accent1"/>
-          </a:effectRef>
-          <a:fontRef idx="minor">
-            <a:schemeClr val="lt1"/>
-          </a:fontRef>
-        </p:style>
-        <p:txBody>
-          <a:bodyPr rtlCol="0" anchor="ctr"/>
-          <a:lstStyle/>
-          <a:p>
-            <a:pPr algn="ctr"/>
-            <a:endParaRPr lang="en-US" dirty="0"/>
-          </a:p>
-        </p:txBody>
-      </p:sp>
-      <p:sp>
-        <p:nvSpPr>
-          <p:cNvPr id="7" name="TextBox 6">
-            <a:extLst>
-              <a:ext uri="{FF2B5EF4-FFF2-40B4-BE49-F238E27FC236}">
-                <a16:creationId xmlns:a16="http://schemas.microsoft.com/office/drawing/2014/main" id="{65E7E879-7387-8641-96BE-7A196924F4D7}"/>
-              </a:ext>
-            </a:extLst>
-          </p:cNvPr>
-          <p:cNvSpPr txBox="1"/>
-          <p:nvPr/>
-        </p:nvSpPr>
-        <p:spPr>
-          <a:xfrm>
-            <a:off x="200722" y="3144647"/>
-            <a:ext cx="1178849" cy="461665"/>
-          </a:xfrm>
-          <a:prstGeom prst="rect">
-            <a:avLst/>
-          </a:prstGeom>
-          <a:noFill/>
-        </p:spPr>
-        <p:txBody>
-          <a:bodyPr wrap="none" rtlCol="0">
-            <a:spAutoFit/>
-          </a:bodyPr>
-          <a:lstStyle/>
-          <a:p>
-            <a:r>
-              <a:rPr lang="en-US" sz="2400" dirty="0">
-                <a:solidFill>
-                  <a:srgbClr val="C00000"/>
-                </a:solidFill>
-              </a:rPr>
-              <a:t>variable</a:t>
-            </a:r>
-          </a:p>
-        </p:txBody>
-      </p:sp>
-      <p:cxnSp>
-        <p:nvCxnSpPr>
-          <p:cNvPr id="9" name="Straight Arrow Connector 8">
-            <a:extLst>
-              <a:ext uri="{FF2B5EF4-FFF2-40B4-BE49-F238E27FC236}">
-                <a16:creationId xmlns:a16="http://schemas.microsoft.com/office/drawing/2014/main" id="{428C0CFF-48A7-E348-A427-C0F80393BA6E}"/>
-              </a:ext>
-            </a:extLst>
-          </p:cNvPr>
-          <p:cNvCxnSpPr>
-            <a:stCxn id="7" idx="2"/>
-          </p:cNvCxnSpPr>
-          <p:nvPr/>
-        </p:nvCxnSpPr>
-        <p:spPr>
-          <a:xfrm>
-            <a:off x="790147" y="3606312"/>
-            <a:ext cx="748721" cy="162801"/>
-          </a:xfrm>
-          <a:prstGeom prst="straightConnector1">
-            <a:avLst/>
-          </a:prstGeom>
-          <a:ln w="25400">
-            <a:solidFill>
-              <a:srgbClr val="C00000"/>
-            </a:solidFill>
-            <a:tailEnd type="triangle"/>
-          </a:ln>
-        </p:spPr>
-        <p:style>
-          <a:lnRef idx="1">
-            <a:schemeClr val="accent1"/>
-          </a:lnRef>
-          <a:fillRef idx="0">
-            <a:schemeClr val="accent1"/>
-          </a:fillRef>
-          <a:effectRef idx="0">
-            <a:schemeClr val="accent1"/>
-          </a:effectRef>
-          <a:fontRef idx="minor">
-            <a:schemeClr val="tx1"/>
-          </a:fontRef>
-        </p:style>
-      </p:cxnSp>
-    </p:spTree>
-    <p:extLst>
-      <p:ext uri="{BB962C8B-B14F-4D97-AF65-F5344CB8AC3E}">
-        <p14:creationId xmlns:p14="http://schemas.microsoft.com/office/powerpoint/2010/main" val="32404226"/>
-      </p:ext>
-    </p:extLst>
-  </p:cSld>
-  <p:clrMapOvr>
-    <a:masterClrMapping/>
-  </p:clrMapOvr>
-  <p:timing>
-    <p:tnLst>
-      <p:par>
-        <p:cTn id="1" dur="indefinite" restart="never" nodeType="tmRoot">
-          <p:childTnLst>
-            <p:seq concurrent="1" nextAc="seek">
-              <p:cTn id="2" dur="indefinite" nodeType="mainSeq">
-                <p:childTnLst>
-                  <p:par>
-                    <p:cTn id="3" fill="hold">
-                      <p:stCondLst>
-                        <p:cond delay="indefinite"/>
-                      </p:stCondLst>
-                      <p:childTnLst>
-                        <p:par>
-                          <p:cTn id="4" fill="hold">
-                            <p:stCondLst>
-                              <p:cond delay="0"/>
-                            </p:stCondLst>
-                            <p:childTnLst>
-                              <p:par>
-                                <p:cTn id="5" presetID="1" presetClass="entr" presetSubtype="0" fill="hold" grpId="0" nodeType="clickEffect">
-                                  <p:stCondLst>
-                                    <p:cond delay="0"/>
-                                  </p:stCondLst>
-                                  <p:childTnLst>
-                                    <p:set>
-                                      <p:cBhvr>
-                                        <p:cTn id="6" dur="1" fill="hold">
-                                          <p:stCondLst>
-                                            <p:cond delay="0"/>
-                                          </p:stCondLst>
-                                        </p:cTn>
-                                        <p:tgtEl>
-                                          <p:spTgt spid="6"/>
-                                        </p:tgtEl>
-                                        <p:attrNameLst>
-                                          <p:attrName>style.visibility</p:attrName>
-                                        </p:attrNameLst>
-                                      </p:cBhvr>
-                                      <p:to>
-                                        <p:strVal val="visible"/>
-                                      </p:to>
-                                    </p:set>
-                                  </p:childTnLst>
-                                </p:cTn>
-                              </p:par>
-                              <p:par>
-                                <p:cTn id="7" presetID="1" presetClass="entr" presetSubtype="0" fill="hold" nodeType="withEffect">
-                                  <p:stCondLst>
-                                    <p:cond delay="0"/>
-                                  </p:stCondLst>
-                                  <p:childTnLst>
-                                    <p:set>
-                                      <p:cBhvr>
-                                        <p:cTn id="8" dur="1" fill="hold">
-                                          <p:stCondLst>
-                                            <p:cond delay="0"/>
-                                          </p:stCondLst>
-                                        </p:cTn>
-                                        <p:tgtEl>
-                                          <p:spTgt spid="9"/>
-                                        </p:tgtEl>
-                                        <p:attrNameLst>
-                                          <p:attrName>style.visibility</p:attrName>
-                                        </p:attrNameLst>
-                                      </p:cBhvr>
-                                      <p:to>
-                                        <p:strVal val="visible"/>
-                                      </p:to>
-                                    </p:set>
-                                  </p:childTnLst>
-                                </p:cTn>
-                              </p:par>
-                              <p:par>
-                                <p:cTn id="9" presetID="1" presetClass="entr" presetSubtype="0" fill="hold" grpId="0" nodeType="withEffect">
-                                  <p:stCondLst>
-                                    <p:cond delay="0"/>
-                                  </p:stCondLst>
-                                  <p:childTnLst>
-                                    <p:set>
-                                      <p:cBhvr>
-                                        <p:cTn id="10" dur="1" fill="hold">
-                                          <p:stCondLst>
-                                            <p:cond delay="0"/>
-                                          </p:stCondLst>
-                                        </p:cTn>
-                                        <p:tgtEl>
-                                          <p:spTgt spid="7"/>
-                                        </p:tgtEl>
-                                        <p:attrNameLst>
-                                          <p:attrName>style.visibility</p:attrName>
-                                        </p:attrNameLst>
-                                      </p:cBhvr>
-                                      <p:to>
-                                        <p:strVal val="visible"/>
-                                      </p:to>
-                                    </p:set>
-                                  </p:childTnLst>
-                                </p:cTn>
-                              </p:par>
-                            </p:childTnLst>
-                          </p:cTn>
-                        </p:par>
-                      </p:childTnLst>
-                    </p:cTn>
-                  </p:par>
-                </p:childTnLst>
-              </p:cTn>
-              <p:prevCondLst>
-                <p:cond evt="onPrev" delay="0">
-                  <p:tgtEl>
-                    <p:sldTgt/>
-                  </p:tgtEl>
-                </p:cond>
-              </p:prevCondLst>
-              <p:nextCondLst>
-                <p:cond evt="onNext" delay="0">
-                  <p:tgtEl>
-                    <p:sldTgt/>
-                  </p:tgtEl>
-                </p:cond>
-              </p:nextCondLst>
-            </p:seq>
-          </p:childTnLst>
-        </p:cTn>
-      </p:par>
-    </p:tnLst>
-    <p:bldLst>
-      <p:bldP spid="6" grpId="0" animBg="1"/>
-      <p:bldP spid="7" grpId="0"/>
-    </p:bldLst>
   </p:timing>
 </p:sld>
 </file>

</xml_diff>